<commit_message>
Reformat Tasks 5 and produce pdf.
</commit_message>
<xml_diff>
--- a/tasks5.pptx
+++ b/tasks5.pptx
@@ -3383,7 +3383,7 @@
         <p:spPr>
           <a:xfrm>
             <a:off x="696000" y="729000"/>
-            <a:ext cx="10800000" cy="3016210"/>
+            <a:ext cx="10800000" cy="3631763"/>
           </a:xfrm>
           <a:prstGeom prst="rect">
             <a:avLst/>
@@ -3449,6 +3449,25 @@
             </a:endParaRPr>
           </a:p>
           <a:p>
+            <a:pPr marL="0" indent="0" algn="ctr">
+              <a:buNone/>
+            </a:pPr>
+            <a:endParaRPr kumimoji="0" lang="en-GB" sz="4000" b="1" i="0" u="none" strike="noStrike" kern="1200" cap="none" spc="0" normalizeH="0" baseline="0" noProof="0" dirty="0">
+              <a:ln>
+                <a:noFill/>
+              </a:ln>
+              <a:solidFill>
+                <a:prstClr val="black"/>
+              </a:solidFill>
+              <a:effectLst/>
+              <a:uLnTx/>
+              <a:uFillTx/>
+              <a:latin typeface="Atkinson Hyperlegible" pitchFamily="50" charset="0"/>
+              <a:ea typeface="+mj-ea"/>
+              <a:cs typeface="+mj-cs"/>
+            </a:endParaRPr>
+          </a:p>
+          <a:p>
             <a:pPr marL="742950" indent="-742950">
               <a:buFont typeface="+mj-lt"/>
               <a:buAutoNum type="arabicPeriod"/>
@@ -3458,11 +3477,22 @@
                 <a:solidFill>
                   <a:prstClr val="black"/>
                 </a:solidFill>
-                <a:latin typeface="Atkinson Hyperlegible" pitchFamily="50" charset="0"/>
-                <a:ea typeface="+mj-ea"/>
-                <a:cs typeface="+mj-cs"/>
-              </a:rPr>
-              <a:t>)CLEAR your workspace</a:t>
+                <a:latin typeface="APL385 Unicode" panose="020B0709000202000203" pitchFamily="49" charset="0"/>
+                <a:ea typeface="+mj-ea"/>
+                <a:cs typeface="+mj-cs"/>
+              </a:rPr>
+              <a:t>)CLEAR</a:t>
+            </a:r>
+            <a:r>
+              <a:rPr lang="en-GB" sz="3000" dirty="0">
+                <a:solidFill>
+                  <a:prstClr val="black"/>
+                </a:solidFill>
+                <a:latin typeface="Atkinson Hyperlegible" pitchFamily="50" charset="0"/>
+                <a:ea typeface="+mj-ea"/>
+                <a:cs typeface="+mj-cs"/>
+              </a:rPr>
+              <a:t> to clear your workspace</a:t>
             </a:r>
           </a:p>
           <a:p>
@@ -3489,11 +3519,22 @@
                 <a:solidFill>
                   <a:prstClr val="black"/>
                 </a:solidFill>
-                <a:latin typeface="Atkinson Hyperlegible" pitchFamily="50" charset="0"/>
-                <a:ea typeface="+mj-ea"/>
-                <a:cs typeface="+mj-cs"/>
-              </a:rPr>
-              <a:t>)SAVE your workspace with a workspace ID like </a:t>
+                <a:latin typeface="APL385 Unicode" panose="020B0709000202000203" pitchFamily="49" charset="0"/>
+                <a:ea typeface="+mj-ea"/>
+                <a:cs typeface="+mj-cs"/>
+              </a:rPr>
+              <a:t>)SAVE </a:t>
+            </a:r>
+            <a:r>
+              <a:rPr lang="en-GB" sz="3000" dirty="0">
+                <a:solidFill>
+                  <a:prstClr val="black"/>
+                </a:solidFill>
+                <a:latin typeface="Atkinson Hyperlegible" pitchFamily="50" charset="0"/>
+                <a:ea typeface="+mj-ea"/>
+                <a:cs typeface="+mj-cs"/>
+              </a:rPr>
+              <a:t>your workspace with a workspace ID like </a:t>
             </a:r>
             <a:r>
               <a:rPr lang="en-GB" sz="3000" b="1" dirty="0">
@@ -3576,7 +3617,7 @@
         <p:spPr>
           <a:xfrm>
             <a:off x="696000" y="369000"/>
-            <a:ext cx="10800000" cy="6124754"/>
+            <a:ext cx="10800000" cy="6463308"/>
           </a:xfrm>
           <a:prstGeom prst="rect">
             <a:avLst/>
@@ -3645,6 +3686,25 @@
             <a:pPr marL="0" indent="0">
               <a:buNone/>
             </a:pPr>
+            <a:endParaRPr kumimoji="0" lang="en-US" sz="2200" i="0" u="none" strike="noStrike" kern="1200" cap="none" spc="0" normalizeH="0" baseline="0" noProof="0" dirty="0">
+              <a:ln>
+                <a:noFill/>
+              </a:ln>
+              <a:solidFill>
+                <a:prstClr val="black"/>
+              </a:solidFill>
+              <a:effectLst/>
+              <a:uLnTx/>
+              <a:uFillTx/>
+              <a:latin typeface="Atkinson Hyperlegible" pitchFamily="50" charset="0"/>
+              <a:ea typeface="+mj-ea"/>
+              <a:cs typeface="+mj-cs"/>
+            </a:endParaRPr>
+          </a:p>
+          <a:p>
+            <a:pPr marL="0" indent="0">
+              <a:buNone/>
+            </a:pPr>
             <a:r>
               <a:rPr kumimoji="0" lang="en-US" sz="2200" i="0" u="none" strike="noStrike" kern="1200" cap="none" spc="0" normalizeH="0" baseline="0" noProof="0" dirty="0">
                 <a:ln>
@@ -3667,7 +3727,7 @@
                 <a:solidFill>
                   <a:prstClr val="black"/>
                 </a:solidFill>
-                <a:latin typeface="Atkinson Hyperlegible" pitchFamily="50" charset="0"/>
+                <a:latin typeface="APL385 Unicode" panose="020B0709000202000203" pitchFamily="49" charset="0"/>
                 <a:ea typeface="+mj-ea"/>
                 <a:cs typeface="+mj-cs"/>
               </a:rPr>
@@ -3767,7 +3827,7 @@
                 <a:solidFill>
                   <a:prstClr val="black"/>
                 </a:solidFill>
-                <a:latin typeface="Atkinson Hyperlegible" pitchFamily="50" charset="0"/>
+                <a:latin typeface="APL385 Unicode" panose="020B0709000202000203" pitchFamily="49" charset="0"/>
                 <a:ea typeface="+mj-ea"/>
                 <a:cs typeface="+mj-cs"/>
               </a:rPr>
@@ -3927,7 +3987,7 @@
                 <a:solidFill>
                   <a:prstClr val="black"/>
                 </a:solidFill>
-                <a:latin typeface="Atkinson Hyperlegible" pitchFamily="50" charset="0"/>
+                <a:latin typeface="APL385 Unicode" panose="020B0709000202000203" pitchFamily="49" charset="0"/>
                 <a:ea typeface="+mj-ea"/>
                 <a:cs typeface="+mj-cs"/>
               </a:rPr>
@@ -4122,7 +4182,7 @@
         <p:spPr>
           <a:xfrm>
             <a:off x="696000" y="729000"/>
-            <a:ext cx="10800000" cy="5447645"/>
+            <a:ext cx="10800000" cy="5786199"/>
           </a:xfrm>
           <a:prstGeom prst="rect">
             <a:avLst/>
@@ -4197,7 +4257,29 @@
                 <a:ea typeface="+mj-ea"/>
                 <a:cs typeface="+mj-cs"/>
               </a:rPr>
-              <a:t>The 3D array rain gives the monthly rainfall in millimetres over 7 years for 5 countries.</a:t>
+              <a:t>The 3D array </a:t>
+            </a:r>
+            <a:r>
+              <a:rPr lang="en-GB" sz="2200" dirty="0">
+                <a:solidFill>
+                  <a:prstClr val="black"/>
+                </a:solidFill>
+                <a:latin typeface="APL385 Unicode" panose="020B0709000202000203" pitchFamily="49" charset="0"/>
+                <a:ea typeface="+mj-ea"/>
+                <a:cs typeface="+mj-cs"/>
+              </a:rPr>
+              <a:t>rain</a:t>
+            </a:r>
+            <a:r>
+              <a:rPr lang="en-GB" sz="2200" dirty="0">
+                <a:solidFill>
+                  <a:prstClr val="black"/>
+                </a:solidFill>
+                <a:latin typeface="Atkinson Hyperlegible" pitchFamily="50" charset="0"/>
+                <a:ea typeface="+mj-ea"/>
+                <a:cs typeface="+mj-cs"/>
+              </a:rPr>
+              <a:t> gives the monthly rainfall in millimetres over 7 years for 5 countries.</a:t>
             </a:r>
           </a:p>
           <a:p>
@@ -4424,7 +4506,7 @@
         <p:spPr>
           <a:xfrm>
             <a:off x="696000" y="729000"/>
-            <a:ext cx="10800000" cy="3754874"/>
+            <a:ext cx="10800000" cy="5663089"/>
           </a:xfrm>
           <a:prstGeom prst="rect">
             <a:avLst/>
@@ -4490,19 +4572,6 @@
             </a:endParaRPr>
           </a:p>
           <a:p>
-            <a:r>
-              <a:rPr lang="en-GB" sz="2200" dirty="0">
-                <a:solidFill>
-                  <a:prstClr val="black"/>
-                </a:solidFill>
-                <a:latin typeface="Atkinson Hyperlegible" pitchFamily="50" charset="0"/>
-                <a:ea typeface="+mj-ea"/>
-                <a:cs typeface="+mj-cs"/>
-              </a:rPr>
-              <a:t>Assign scalar numeric values (single numbers) to the variables years, countries and months such that the rain data can be summarised as follows:</a:t>
-            </a:r>
-          </a:p>
-          <a:p>
             <a:endParaRPr lang="en-GB" sz="2200" dirty="0">
               <a:solidFill>
                 <a:prstClr val="black"/>
@@ -4514,86 +4583,186 @@
           </a:p>
           <a:p>
             <a:r>
-              <a:rPr lang="en-US" sz="2200" dirty="0">
-                <a:solidFill>
-                  <a:prstClr val="black"/>
-                </a:solidFill>
-                <a:latin typeface="Atkinson Hyperlegible" pitchFamily="50" charset="0"/>
-                <a:ea typeface="+mj-ea"/>
-                <a:cs typeface="+mj-cs"/>
-              </a:rPr>
-              <a:t> ⍴+/[years]rain   ⍝ Sum over years</a:t>
-            </a:r>
-          </a:p>
-          <a:p>
-            <a:r>
-              <a:rPr lang="en-US" sz="2200" dirty="0">
-                <a:solidFill>
-                  <a:prstClr val="black"/>
-                </a:solidFill>
-                <a:latin typeface="Atkinson Hyperlegible" pitchFamily="50" charset="0"/>
-                <a:ea typeface="+mj-ea"/>
-                <a:cs typeface="+mj-cs"/>
-              </a:rPr>
-              <a:t>5 12</a:t>
-            </a:r>
-          </a:p>
-          <a:p>
-            <a:r>
-              <a:rPr lang="en-US" sz="2200" dirty="0">
-                <a:solidFill>
-                  <a:prstClr val="black"/>
-                </a:solidFill>
-                <a:latin typeface="Atkinson Hyperlegible" pitchFamily="50" charset="0"/>
-                <a:ea typeface="+mj-ea"/>
-                <a:cs typeface="+mj-cs"/>
-              </a:rPr>
-              <a:t>      ⍴+/[countries]rain   ⍝ Sum over countries</a:t>
-            </a:r>
-          </a:p>
-          <a:p>
-            <a:r>
-              <a:rPr lang="en-US" sz="2200" dirty="0">
-                <a:solidFill>
-                  <a:prstClr val="black"/>
-                </a:solidFill>
-                <a:latin typeface="Atkinson Hyperlegible" pitchFamily="50" charset="0"/>
-                <a:ea typeface="+mj-ea"/>
-                <a:cs typeface="+mj-cs"/>
-              </a:rPr>
-              <a:t>7 12</a:t>
-            </a:r>
-          </a:p>
-          <a:p>
-            <a:r>
-              <a:rPr lang="en-US" sz="2200" dirty="0">
-                <a:solidFill>
-                  <a:prstClr val="black"/>
-                </a:solidFill>
-                <a:latin typeface="Atkinson Hyperlegible" pitchFamily="50" charset="0"/>
-                <a:ea typeface="+mj-ea"/>
-                <a:cs typeface="+mj-cs"/>
-              </a:rPr>
-              <a:t>      ⍴⌈/[months]rain   ⍝ Max over month</a:t>
-            </a:r>
-          </a:p>
-          <a:p>
-            <a:r>
-              <a:rPr lang="en-US" sz="2200" dirty="0">
-                <a:solidFill>
-                  <a:prstClr val="black"/>
-                </a:solidFill>
-                <a:latin typeface="Atkinson Hyperlegible" pitchFamily="50" charset="0"/>
-                <a:ea typeface="+mj-ea"/>
-                <a:cs typeface="+mj-cs"/>
-              </a:rPr>
-              <a:t>7 5</a:t>
-            </a:r>
-            <a:endParaRPr lang="en-GB" sz="2200" dirty="0">
+              <a:rPr lang="en-GB" sz="3000" dirty="0">
+                <a:solidFill>
+                  <a:prstClr val="black"/>
+                </a:solidFill>
+                <a:latin typeface="Atkinson Hyperlegible" pitchFamily="50" charset="0"/>
+                <a:ea typeface="+mj-ea"/>
+                <a:cs typeface="+mj-cs"/>
+              </a:rPr>
+              <a:t>Assign scalar numeric values (single numbers) to the variables </a:t>
+            </a:r>
+            <a:r>
+              <a:rPr lang="en-GB" sz="3000" dirty="0">
+                <a:solidFill>
+                  <a:prstClr val="black"/>
+                </a:solidFill>
+                <a:latin typeface="APL385 Unicode" panose="020B0709000202000203" pitchFamily="49" charset="0"/>
+                <a:ea typeface="+mj-ea"/>
+                <a:cs typeface="+mj-cs"/>
+              </a:rPr>
+              <a:t>years</a:t>
+            </a:r>
+            <a:r>
+              <a:rPr lang="en-GB" sz="3000" dirty="0">
+                <a:solidFill>
+                  <a:prstClr val="black"/>
+                </a:solidFill>
+                <a:latin typeface="Atkinson Hyperlegible" pitchFamily="50" charset="0"/>
+                <a:ea typeface="+mj-ea"/>
+                <a:cs typeface="+mj-cs"/>
+              </a:rPr>
+              <a:t>, </a:t>
+            </a:r>
+            <a:r>
+              <a:rPr lang="en-GB" sz="3000" dirty="0">
+                <a:solidFill>
+                  <a:prstClr val="black"/>
+                </a:solidFill>
+                <a:latin typeface="APL385 Unicode" panose="020B0709000202000203" pitchFamily="49" charset="0"/>
+                <a:ea typeface="+mj-ea"/>
+                <a:cs typeface="+mj-cs"/>
+              </a:rPr>
+              <a:t>countries</a:t>
+            </a:r>
+            <a:r>
+              <a:rPr lang="en-GB" sz="3000" dirty="0">
+                <a:solidFill>
+                  <a:prstClr val="black"/>
+                </a:solidFill>
+                <a:latin typeface="Atkinson Hyperlegible" pitchFamily="50" charset="0"/>
+                <a:ea typeface="+mj-ea"/>
+                <a:cs typeface="+mj-cs"/>
+              </a:rPr>
+              <a:t> and </a:t>
+            </a:r>
+            <a:r>
+              <a:rPr lang="en-GB" sz="3000" dirty="0">
+                <a:solidFill>
+                  <a:prstClr val="black"/>
+                </a:solidFill>
+                <a:latin typeface="APL385 Unicode" panose="020B0709000202000203" pitchFamily="49" charset="0"/>
+                <a:ea typeface="+mj-ea"/>
+                <a:cs typeface="+mj-cs"/>
+              </a:rPr>
+              <a:t>months</a:t>
+            </a:r>
+            <a:r>
+              <a:rPr lang="en-GB" sz="3000" dirty="0">
+                <a:solidFill>
+                  <a:prstClr val="black"/>
+                </a:solidFill>
+                <a:latin typeface="Atkinson Hyperlegible" pitchFamily="50" charset="0"/>
+                <a:ea typeface="+mj-ea"/>
+                <a:cs typeface="+mj-cs"/>
+              </a:rPr>
+              <a:t> such that the rain data can be summarised as follows:</a:t>
+            </a:r>
+          </a:p>
+          <a:p>
+            <a:endParaRPr lang="en-GB" sz="3000" dirty="0">
               <a:solidFill>
                 <a:prstClr val="black"/>
               </a:solidFill>
               <a:latin typeface="Atkinson Hyperlegible" pitchFamily="50" charset="0"/>
+              <a:ea typeface="+mj-ea"/>
+              <a:cs typeface="+mj-cs"/>
+            </a:endParaRPr>
+          </a:p>
+          <a:p>
+            <a:r>
+              <a:rPr lang="en-US" sz="3000" dirty="0">
+                <a:solidFill>
+                  <a:prstClr val="black"/>
+                </a:solidFill>
+                <a:latin typeface="Atkinson Hyperlegible" pitchFamily="50" charset="0"/>
+                <a:ea typeface="+mj-ea"/>
+                <a:cs typeface="+mj-cs"/>
+              </a:rPr>
+              <a:t>	</a:t>
+            </a:r>
+            <a:r>
+              <a:rPr lang="en-US" sz="3000" dirty="0">
+                <a:solidFill>
+                  <a:prstClr val="black"/>
+                </a:solidFill>
+                <a:latin typeface="APL385 Unicode" panose="020B0709000202000203" pitchFamily="49" charset="0"/>
+                <a:ea typeface="+mj-ea"/>
+                <a:cs typeface="+mj-cs"/>
+              </a:rPr>
+              <a:t>⍴+/[years]rain       ⍝ Sum over years</a:t>
+            </a:r>
+          </a:p>
+          <a:p>
+            <a:r>
+              <a:rPr lang="en-US" sz="3000" dirty="0">
+                <a:solidFill>
+                  <a:prstClr val="black"/>
+                </a:solidFill>
+                <a:latin typeface="APL385 Unicode" panose="020B0709000202000203" pitchFamily="49" charset="0"/>
+                <a:ea typeface="+mj-ea"/>
+                <a:cs typeface="+mj-cs"/>
+              </a:rPr>
+              <a:t>5 12</a:t>
+            </a:r>
+          </a:p>
+          <a:p>
+            <a:r>
+              <a:rPr lang="en-US" sz="3000" dirty="0">
+                <a:solidFill>
+                  <a:prstClr val="black"/>
+                </a:solidFill>
+                <a:latin typeface="APL385 Unicode" panose="020B0709000202000203" pitchFamily="49" charset="0"/>
+                <a:ea typeface="+mj-ea"/>
+                <a:cs typeface="+mj-cs"/>
+              </a:rPr>
+              <a:t>	⍴+/[countries]rain   ⍝ Sum over countries</a:t>
+            </a:r>
+          </a:p>
+          <a:p>
+            <a:r>
+              <a:rPr lang="en-US" sz="3000" dirty="0">
+                <a:solidFill>
+                  <a:prstClr val="black"/>
+                </a:solidFill>
+                <a:latin typeface="APL385 Unicode" panose="020B0709000202000203" pitchFamily="49" charset="0"/>
+                <a:ea typeface="+mj-ea"/>
+                <a:cs typeface="+mj-cs"/>
+              </a:rPr>
+              <a:t>7 12</a:t>
+            </a:r>
+          </a:p>
+          <a:p>
+            <a:r>
+              <a:rPr lang="en-US" sz="3000" dirty="0">
+                <a:solidFill>
+                  <a:prstClr val="black"/>
+                </a:solidFill>
+                <a:latin typeface="APL385 Unicode" panose="020B0709000202000203" pitchFamily="49" charset="0"/>
+                <a:ea typeface="+mj-ea"/>
+                <a:cs typeface="+mj-cs"/>
+              </a:rPr>
+              <a:t>	⍴⌈/[months]rain      ⍝ Max over month</a:t>
+            </a:r>
+          </a:p>
+          <a:p>
+            <a:r>
+              <a:rPr lang="en-US" sz="3000" dirty="0">
+                <a:solidFill>
+                  <a:prstClr val="black"/>
+                </a:solidFill>
+                <a:latin typeface="APL385 Unicode" panose="020B0709000202000203" pitchFamily="49" charset="0"/>
+                <a:ea typeface="+mj-ea"/>
+                <a:cs typeface="+mj-cs"/>
+              </a:rPr>
+              <a:t>7 5</a:t>
+            </a:r>
+            <a:endParaRPr lang="en-GB" sz="3000" dirty="0">
+              <a:solidFill>
+                <a:prstClr val="black"/>
+              </a:solidFill>
+              <a:latin typeface="APL385 Unicode" panose="020B0709000202000203" pitchFamily="49" charset="0"/>
               <a:ea typeface="+mj-ea"/>
               <a:cs typeface="+mj-cs"/>
             </a:endParaRPr>
@@ -4720,7 +4889,161 @@
                 <a:ea typeface="+mj-ea"/>
                 <a:cs typeface="+mj-cs"/>
               </a:rPr>
-              <a:t>Write a function to find the average over an axis specified by a character scalar ⍺, with 'Y' representing Years, 'C' representing Countries, and 'M' representing Months.</a:t>
+              <a:t>Write a function to find the average over an axis specified by a character scalar </a:t>
+            </a:r>
+            <a:r>
+              <a:rPr lang="en-GB" sz="2000" dirty="0">
+                <a:solidFill>
+                  <a:prstClr val="black"/>
+                </a:solidFill>
+                <a:latin typeface="APL385 Unicode" panose="020B0709000202000203" pitchFamily="49" charset="0"/>
+                <a:ea typeface="+mj-ea"/>
+                <a:cs typeface="+mj-cs"/>
+              </a:rPr>
+              <a:t>⍺</a:t>
+            </a:r>
+            <a:r>
+              <a:rPr lang="en-GB" sz="2000" dirty="0">
+                <a:solidFill>
+                  <a:prstClr val="black"/>
+                </a:solidFill>
+                <a:latin typeface="Atkinson Hyperlegible" pitchFamily="50" charset="0"/>
+                <a:ea typeface="+mj-ea"/>
+                <a:cs typeface="+mj-cs"/>
+              </a:rPr>
+              <a:t>, with </a:t>
+            </a:r>
+            <a:r>
+              <a:rPr lang="en-GB" sz="2000" dirty="0">
+                <a:solidFill>
+                  <a:prstClr val="black"/>
+                </a:solidFill>
+                <a:latin typeface="APL385 Unicode" panose="020B0709000202000203" pitchFamily="49" charset="0"/>
+                <a:ea typeface="+mj-ea"/>
+                <a:cs typeface="+mj-cs"/>
+              </a:rPr>
+              <a:t>'Y'</a:t>
+            </a:r>
+            <a:r>
+              <a:rPr lang="en-GB" sz="2000" dirty="0">
+                <a:solidFill>
+                  <a:prstClr val="black"/>
+                </a:solidFill>
+                <a:latin typeface="Atkinson Hyperlegible" pitchFamily="50" charset="0"/>
+                <a:ea typeface="+mj-ea"/>
+                <a:cs typeface="+mj-cs"/>
+              </a:rPr>
+              <a:t> representing </a:t>
+            </a:r>
+            <a:r>
+              <a:rPr lang="en-GB" sz="2000" dirty="0">
+                <a:solidFill>
+                  <a:prstClr val="black"/>
+                </a:solidFill>
+                <a:latin typeface="APL385 Unicode" panose="020B0709000202000203" pitchFamily="49" charset="0"/>
+                <a:ea typeface="+mj-ea"/>
+                <a:cs typeface="+mj-cs"/>
+              </a:rPr>
+              <a:t>years</a:t>
+            </a:r>
+            <a:r>
+              <a:rPr lang="en-GB" sz="2000" dirty="0">
+                <a:solidFill>
+                  <a:prstClr val="black"/>
+                </a:solidFill>
+                <a:latin typeface="Atkinson Hyperlegible" pitchFamily="50" charset="0"/>
+                <a:ea typeface="+mj-ea"/>
+                <a:cs typeface="+mj-cs"/>
+              </a:rPr>
+              <a:t>, </a:t>
+            </a:r>
+            <a:r>
+              <a:rPr lang="en-GB" sz="2000" dirty="0">
+                <a:solidFill>
+                  <a:prstClr val="black"/>
+                </a:solidFill>
+                <a:latin typeface="APL385 Unicode" panose="020B0709000202000203" pitchFamily="49" charset="0"/>
+                <a:ea typeface="+mj-ea"/>
+                <a:cs typeface="+mj-cs"/>
+              </a:rPr>
+              <a:t>'C'</a:t>
+            </a:r>
+            <a:r>
+              <a:rPr lang="en-GB" sz="2000" dirty="0">
+                <a:solidFill>
+                  <a:prstClr val="black"/>
+                </a:solidFill>
+                <a:latin typeface="Atkinson Hyperlegible" pitchFamily="50" charset="0"/>
+                <a:ea typeface="+mj-ea"/>
+                <a:cs typeface="+mj-cs"/>
+              </a:rPr>
+              <a:t> representing </a:t>
+            </a:r>
+            <a:r>
+              <a:rPr lang="en-GB" sz="2000" dirty="0">
+                <a:solidFill>
+                  <a:prstClr val="black"/>
+                </a:solidFill>
+                <a:latin typeface="APL385 Unicode" panose="020B0709000202000203" pitchFamily="49" charset="0"/>
+                <a:ea typeface="+mj-ea"/>
+                <a:cs typeface="+mj-cs"/>
+              </a:rPr>
+              <a:t>countries</a:t>
+            </a:r>
+            <a:r>
+              <a:rPr lang="en-GB" sz="2000" dirty="0">
+                <a:solidFill>
+                  <a:prstClr val="black"/>
+                </a:solidFill>
+                <a:latin typeface="Atkinson Hyperlegible" pitchFamily="50" charset="0"/>
+                <a:ea typeface="+mj-ea"/>
+                <a:cs typeface="+mj-cs"/>
+              </a:rPr>
+              <a:t>, and </a:t>
+            </a:r>
+            <a:r>
+              <a:rPr lang="en-GB" sz="2000" dirty="0">
+                <a:solidFill>
+                  <a:prstClr val="black"/>
+                </a:solidFill>
+                <a:latin typeface="APL385 Unicode" panose="020B0709000202000203" pitchFamily="49" charset="0"/>
+                <a:ea typeface="+mj-ea"/>
+                <a:cs typeface="+mj-cs"/>
+              </a:rPr>
+              <a:t>'M'</a:t>
+            </a:r>
+            <a:r>
+              <a:rPr lang="en-GB" sz="2000" dirty="0">
+                <a:solidFill>
+                  <a:prstClr val="black"/>
+                </a:solidFill>
+                <a:latin typeface="Atkinson Hyperlegible" pitchFamily="50" charset="0"/>
+                <a:ea typeface="+mj-ea"/>
+                <a:cs typeface="+mj-cs"/>
+              </a:rPr>
+              <a:t> representing </a:t>
+            </a:r>
+            <a:r>
+              <a:rPr lang="en-GB" sz="2000" dirty="0">
+                <a:solidFill>
+                  <a:prstClr val="black"/>
+                </a:solidFill>
+                <a:latin typeface="APL385 Unicode" panose="020B0709000202000203" pitchFamily="49" charset="0"/>
+                <a:ea typeface="+mj-ea"/>
+                <a:cs typeface="+mj-cs"/>
+              </a:rPr>
+              <a:t>months</a:t>
+            </a:r>
+            <a:r>
+              <a:rPr lang="en-GB" sz="2000" dirty="0">
+                <a:solidFill>
+                  <a:prstClr val="black"/>
+                </a:solidFill>
+                <a:latin typeface="Atkinson Hyperlegible" pitchFamily="50" charset="0"/>
+                <a:ea typeface="+mj-ea"/>
+                <a:cs typeface="+mj-cs"/>
+              </a:rPr>
+              <a:t>.</a:t>
             </a:r>
           </a:p>
           <a:p>
@@ -5008,7 +5331,7 @@
         <p:spPr>
           <a:xfrm>
             <a:off x="696000" y="729000"/>
-            <a:ext cx="10800000" cy="2862322"/>
+            <a:ext cx="10800000" cy="3600986"/>
           </a:xfrm>
           <a:prstGeom prst="rect">
             <a:avLst/>
@@ -5077,19 +5400,6 @@
             </a:r>
           </a:p>
           <a:p>
-            <a:r>
-              <a:rPr lang="en-GB" sz="2000" dirty="0">
-                <a:solidFill>
-                  <a:prstClr val="black"/>
-                </a:solidFill>
-                <a:latin typeface="Atkinson Hyperlegible" pitchFamily="50" charset="0"/>
-                <a:ea typeface="+mj-ea"/>
-                <a:cs typeface="+mj-cs"/>
-              </a:rPr>
-              <a:t>Define the following arrays in your workspace:</a:t>
-            </a:r>
-          </a:p>
-          <a:p>
             <a:endParaRPr lang="en-GB" sz="2000" dirty="0">
               <a:solidFill>
                 <a:prstClr val="black"/>
@@ -5101,18 +5411,41 @@
           </a:p>
           <a:p>
             <a:r>
-              <a:rPr lang="en-GB" sz="2000" dirty="0">
-                <a:solidFill>
-                  <a:prstClr val="black"/>
-                </a:solidFill>
-                <a:latin typeface="APL385 Unicode" panose="020B0709000202000203" pitchFamily="49" charset="0"/>
-                <a:ea typeface="+mj-ea"/>
-                <a:cs typeface="+mj-cs"/>
-              </a:rPr>
-              <a:t>	fruits←4 7⍴'Apples </a:t>
-            </a:r>
-            <a:r>
-              <a:rPr lang="en-GB" sz="2000" dirty="0" err="1">
+              <a:rPr lang="en-GB" sz="2800" dirty="0">
+                <a:solidFill>
+                  <a:prstClr val="black"/>
+                </a:solidFill>
+                <a:latin typeface="Atkinson Hyperlegible" pitchFamily="50" charset="0"/>
+                <a:ea typeface="+mj-ea"/>
+                <a:cs typeface="+mj-cs"/>
+              </a:rPr>
+              <a:t>Define the following arrays in your workspace:</a:t>
+            </a:r>
+          </a:p>
+          <a:p>
+            <a:endParaRPr lang="en-GB" sz="2800" dirty="0">
+              <a:solidFill>
+                <a:prstClr val="black"/>
+              </a:solidFill>
+              <a:latin typeface="Atkinson Hyperlegible" pitchFamily="50" charset="0"/>
+              <a:ea typeface="+mj-ea"/>
+              <a:cs typeface="+mj-cs"/>
+            </a:endParaRPr>
+          </a:p>
+          <a:p>
+            <a:r>
+              <a:rPr lang="en-GB" sz="2800" dirty="0">
+                <a:solidFill>
+                  <a:prstClr val="black"/>
+                </a:solidFill>
+                <a:latin typeface="APL385 Unicode" panose="020B0709000202000203" pitchFamily="49" charset="0"/>
+                <a:ea typeface="+mj-ea"/>
+                <a:cs typeface="+mj-cs"/>
+              </a:rPr>
+              <a:t>	fruits ← 4 7⍴'Apples </a:t>
+            </a:r>
+            <a:r>
+              <a:rPr lang="en-GB" sz="2800" dirty="0" err="1">
                 <a:solidFill>
                   <a:prstClr val="black"/>
                 </a:solidFill>
@@ -5123,7 +5456,7 @@
               <a:t>MangoesOrangesBananas</a:t>
             </a:r>
             <a:r>
-              <a:rPr lang="en-GB" sz="2000" dirty="0">
+              <a:rPr lang="en-GB" sz="2800" dirty="0">
                 <a:solidFill>
                   <a:prstClr val="black"/>
                 </a:solidFill>
@@ -5136,31 +5469,31 @@
           </a:p>
           <a:p>
             <a:r>
-              <a:rPr lang="en-GB" sz="2000" dirty="0">
-                <a:solidFill>
-                  <a:prstClr val="black"/>
-                </a:solidFill>
-                <a:latin typeface="APL385 Unicode" panose="020B0709000202000203" pitchFamily="49" charset="0"/>
-                <a:ea typeface="+mj-ea"/>
-                <a:cs typeface="+mj-cs"/>
-              </a:rPr>
-              <a:t>	days←7 3⍴'SunMonTueWedThuFriSat'</a:t>
-            </a:r>
-          </a:p>
-          <a:p>
-            <a:r>
-              <a:rPr lang="en-GB" sz="2000" dirty="0">
-                <a:solidFill>
-                  <a:prstClr val="black"/>
-                </a:solidFill>
-                <a:latin typeface="APL385 Unicode" panose="020B0709000202000203" pitchFamily="49" charset="0"/>
-                <a:ea typeface="+mj-ea"/>
-                <a:cs typeface="+mj-cs"/>
-              </a:rPr>
-              <a:t>	names←3 7⍴'Adam   </a:t>
-            </a:r>
-            <a:r>
-              <a:rPr lang="en-GB" sz="2000" dirty="0" err="1">
+              <a:rPr lang="en-GB" sz="2800" dirty="0">
+                <a:solidFill>
+                  <a:prstClr val="black"/>
+                </a:solidFill>
+                <a:latin typeface="APL385 Unicode" panose="020B0709000202000203" pitchFamily="49" charset="0"/>
+                <a:ea typeface="+mj-ea"/>
+                <a:cs typeface="+mj-cs"/>
+              </a:rPr>
+              <a:t>	days ← 7 3⍴'SunMonTueWedThuFriSat'</a:t>
+            </a:r>
+          </a:p>
+          <a:p>
+            <a:r>
+              <a:rPr lang="en-GB" sz="2800" dirty="0">
+                <a:solidFill>
+                  <a:prstClr val="black"/>
+                </a:solidFill>
+                <a:latin typeface="APL385 Unicode" panose="020B0709000202000203" pitchFamily="49" charset="0"/>
+                <a:ea typeface="+mj-ea"/>
+                <a:cs typeface="+mj-cs"/>
+              </a:rPr>
+              <a:t>	names ← 3 7⍴'Adam   </a:t>
+            </a:r>
+            <a:r>
+              <a:rPr lang="en-GB" sz="2800" dirty="0" err="1">
                 <a:solidFill>
                   <a:prstClr val="black"/>
                 </a:solidFill>
@@ -5171,7 +5504,7 @@
               <a:t>RodrigoRich</a:t>
             </a:r>
             <a:r>
-              <a:rPr lang="en-GB" sz="2000" dirty="0">
+              <a:rPr lang="en-GB" sz="2800" dirty="0">
                 <a:solidFill>
                   <a:prstClr val="black"/>
                 </a:solidFill>
@@ -5184,19 +5517,39 @@
           </a:p>
           <a:p>
             <a:r>
-              <a:rPr lang="en-GB" sz="2000" dirty="0">
-                <a:solidFill>
-                  <a:prstClr val="black"/>
-                </a:solidFill>
-                <a:latin typeface="APL385 Unicode" panose="020B0709000202000203" pitchFamily="49" charset="0"/>
-                <a:ea typeface="+mj-ea"/>
-                <a:cs typeface="+mj-cs"/>
-              </a:rPr>
-              <a:t>	⎕rl←42 ⋄ ate←?3 4 7⍴3</a:t>
-            </a:r>
-          </a:p>
-          <a:p>
-            <a:endParaRPr lang="en-GB" sz="2000" dirty="0">
+              <a:rPr lang="en-GB" sz="2800" dirty="0">
+                <a:solidFill>
+                  <a:prstClr val="black"/>
+                </a:solidFill>
+                <a:latin typeface="APL385 Unicode" panose="020B0709000202000203" pitchFamily="49" charset="0"/>
+                <a:ea typeface="+mj-ea"/>
+                <a:cs typeface="+mj-cs"/>
+              </a:rPr>
+              <a:t>	⎕</a:t>
+            </a:r>
+            <a:r>
+              <a:rPr lang="en-GB" sz="2800" dirty="0" err="1">
+                <a:solidFill>
+                  <a:prstClr val="black"/>
+                </a:solidFill>
+                <a:latin typeface="APL385 Unicode" panose="020B0709000202000203" pitchFamily="49" charset="0"/>
+                <a:ea typeface="+mj-ea"/>
+                <a:cs typeface="+mj-cs"/>
+              </a:rPr>
+              <a:t>rl</a:t>
+            </a:r>
+            <a:r>
+              <a:rPr lang="en-GB" sz="2800" dirty="0">
+                <a:solidFill>
+                  <a:prstClr val="black"/>
+                </a:solidFill>
+                <a:latin typeface="APL385 Unicode" panose="020B0709000202000203" pitchFamily="49" charset="0"/>
+                <a:ea typeface="+mj-ea"/>
+                <a:cs typeface="+mj-cs"/>
+              </a:rPr>
+              <a:t> ← 42 1 ⋄ ate ← ?3 4 7⍴3</a:t>
+            </a:r>
+            <a:endParaRPr lang="en-GB" sz="2800" dirty="0">
               <a:solidFill>
                 <a:prstClr val="black"/>
               </a:solidFill>
@@ -5252,7 +5605,7 @@
         <p:spPr>
           <a:xfrm>
             <a:off x="696000" y="729000"/>
-            <a:ext cx="10800000" cy="3939540"/>
+            <a:ext cx="10800000" cy="5632311"/>
           </a:xfrm>
           <a:prstGeom prst="rect">
             <a:avLst/>
@@ -5321,19 +5674,6 @@
             </a:r>
           </a:p>
           <a:p>
-            <a:r>
-              <a:rPr lang="en-GB" sz="2000" dirty="0">
-                <a:solidFill>
-                  <a:prstClr val="black"/>
-                </a:solidFill>
-                <a:latin typeface="Atkinson Hyperlegible" pitchFamily="50" charset="0"/>
-                <a:ea typeface="+mj-ea"/>
-                <a:cs typeface="+mj-cs"/>
-              </a:rPr>
-              <a:t>Write a function to determine who ate the most throughout the week, when only counting fruits listed in the character matrix ⍵.</a:t>
-            </a:r>
-          </a:p>
-          <a:p>
             <a:endParaRPr lang="en-GB" sz="2000" dirty="0">
               <a:solidFill>
                 <a:prstClr val="black"/>
@@ -5345,7 +5685,52 @@
           </a:p>
           <a:p>
             <a:r>
-              <a:rPr lang="en-GB" sz="2000" dirty="0">
+              <a:rPr lang="en-GB" sz="3000" dirty="0">
+                <a:solidFill>
+                  <a:prstClr val="black"/>
+                </a:solidFill>
+                <a:latin typeface="Atkinson Hyperlegible" pitchFamily="50" charset="0"/>
+                <a:ea typeface="+mj-ea"/>
+                <a:cs typeface="+mj-cs"/>
+              </a:rPr>
+              <a:t>Write a function to determine who ate the most throughout the week, when only counting fruits listed in the character matrix </a:t>
+            </a:r>
+            <a:r>
+              <a:rPr lang="en-GB" sz="3000" dirty="0">
+                <a:solidFill>
+                  <a:prstClr val="black"/>
+                </a:solidFill>
+                <a:latin typeface="APL385 Unicode" panose="020B0709000202000203" pitchFamily="49" charset="0"/>
+                <a:ea typeface="+mj-ea"/>
+                <a:cs typeface="+mj-cs"/>
+              </a:rPr>
+              <a:t>⍵</a:t>
+            </a:r>
+            <a:r>
+              <a:rPr lang="en-GB" sz="3000" dirty="0">
+                <a:solidFill>
+                  <a:prstClr val="black"/>
+                </a:solidFill>
+                <a:latin typeface="Atkinson Hyperlegible" pitchFamily="50" charset="0"/>
+                <a:ea typeface="+mj-ea"/>
+                <a:cs typeface="+mj-cs"/>
+              </a:rPr>
+              <a:t>.</a:t>
+            </a:r>
+          </a:p>
+          <a:p>
+            <a:endParaRPr lang="en-GB" sz="3000" dirty="0">
+              <a:solidFill>
+                <a:prstClr val="black"/>
+              </a:solidFill>
+              <a:latin typeface="Atkinson Hyperlegible" pitchFamily="50" charset="0"/>
+              <a:ea typeface="+mj-ea"/>
+              <a:cs typeface="+mj-cs"/>
+            </a:endParaRPr>
+          </a:p>
+          <a:p>
+            <a:r>
+              <a:rPr lang="en-GB" sz="3000" dirty="0">
                 <a:solidFill>
                   <a:prstClr val="black"/>
                 </a:solidFill>
@@ -5356,7 +5741,7 @@
               <a:t>      </a:t>
             </a:r>
             <a:r>
-              <a:rPr lang="en-GB" sz="2000" dirty="0" err="1">
+              <a:rPr lang="en-GB" sz="3000" dirty="0" err="1">
                 <a:solidFill>
                   <a:prstClr val="black"/>
                 </a:solidFill>
@@ -5367,7 +5752,7 @@
               <a:t>WhoAteMost</a:t>
             </a:r>
             <a:r>
-              <a:rPr lang="en-GB" sz="2000" dirty="0">
+              <a:rPr lang="en-GB" sz="3000" dirty="0">
                 <a:solidFill>
                   <a:prstClr val="black"/>
                 </a:solidFill>
@@ -5380,20 +5765,20 @@
           </a:p>
           <a:p>
             <a:r>
-              <a:rPr lang="en-GB" sz="2000" dirty="0">
-                <a:solidFill>
-                  <a:prstClr val="black"/>
-                </a:solidFill>
-                <a:latin typeface="APL385 Unicode" panose="020B0709000202000203" pitchFamily="49" charset="0"/>
-                <a:ea typeface="+mj-ea"/>
-                <a:cs typeface="+mj-cs"/>
-              </a:rPr>
-              <a:t>Rich   </a:t>
-            </a:r>
-          </a:p>
-          <a:p>
-            <a:r>
-              <a:rPr lang="en-GB" sz="2000" dirty="0">
+              <a:rPr lang="en-GB" sz="3000" dirty="0">
+                <a:solidFill>
+                  <a:prstClr val="black"/>
+                </a:solidFill>
+                <a:latin typeface="APL385 Unicode" panose="020B0709000202000203" pitchFamily="49" charset="0"/>
+                <a:ea typeface="+mj-ea"/>
+                <a:cs typeface="+mj-cs"/>
+              </a:rPr>
+              <a:t>Adam   </a:t>
+            </a:r>
+          </a:p>
+          <a:p>
+            <a:r>
+              <a:rPr lang="en-GB" sz="3000" dirty="0">
                 <a:solidFill>
                   <a:prstClr val="black"/>
                 </a:solidFill>
@@ -5404,7 +5789,7 @@
               <a:t>      </a:t>
             </a:r>
             <a:r>
-              <a:rPr lang="en-GB" sz="2000" dirty="0" err="1">
+              <a:rPr lang="en-GB" sz="3000" dirty="0" err="1">
                 <a:solidFill>
                   <a:prstClr val="black"/>
                 </a:solidFill>
@@ -5415,7 +5800,7 @@
               <a:t>WhoAteMost</a:t>
             </a:r>
             <a:r>
-              <a:rPr lang="en-GB" sz="2000" dirty="0">
+              <a:rPr lang="en-GB" sz="3000" dirty="0">
                 <a:solidFill>
                   <a:prstClr val="black"/>
                 </a:solidFill>
@@ -5428,20 +5813,20 @@
           </a:p>
           <a:p>
             <a:r>
-              <a:rPr lang="en-GB" sz="2000" dirty="0">
-                <a:solidFill>
-                  <a:prstClr val="black"/>
-                </a:solidFill>
-                <a:latin typeface="APL385 Unicode" panose="020B0709000202000203" pitchFamily="49" charset="0"/>
-                <a:ea typeface="+mj-ea"/>
-                <a:cs typeface="+mj-cs"/>
-              </a:rPr>
-              <a:t>Adam   </a:t>
-            </a:r>
-          </a:p>
-          <a:p>
-            <a:r>
-              <a:rPr lang="en-GB" sz="2000" dirty="0">
+              <a:rPr lang="en-GB" sz="3000" dirty="0">
+                <a:solidFill>
+                  <a:prstClr val="black"/>
+                </a:solidFill>
+                <a:latin typeface="APL385 Unicode" panose="020B0709000202000203" pitchFamily="49" charset="0"/>
+                <a:ea typeface="+mj-ea"/>
+                <a:cs typeface="+mj-cs"/>
+              </a:rPr>
+              <a:t>Rodrigo   </a:t>
+            </a:r>
+          </a:p>
+          <a:p>
+            <a:r>
+              <a:rPr lang="en-GB" sz="3000" dirty="0">
                 <a:solidFill>
                   <a:prstClr val="black"/>
                 </a:solidFill>
@@ -5452,7 +5837,7 @@
               <a:t>      </a:t>
             </a:r>
             <a:r>
-              <a:rPr lang="en-GB" sz="2000" dirty="0" err="1">
+              <a:rPr lang="en-GB" sz="3000" dirty="0" err="1">
                 <a:solidFill>
                   <a:prstClr val="black"/>
                 </a:solidFill>
@@ -5463,7 +5848,7 @@
               <a:t>WhoAteMost</a:t>
             </a:r>
             <a:r>
-              <a:rPr lang="en-GB" sz="2000" dirty="0">
+              <a:rPr lang="en-GB" sz="3000" dirty="0">
                 <a:solidFill>
                   <a:prstClr val="black"/>
                 </a:solidFill>
@@ -5476,7 +5861,7 @@
           </a:p>
           <a:p>
             <a:r>
-              <a:rPr lang="en-GB" sz="2000" dirty="0">
+              <a:rPr lang="en-GB" sz="3000" dirty="0">
                 <a:solidFill>
                   <a:prstClr val="black"/>
                 </a:solidFill>
@@ -5486,7 +5871,7 @@
               </a:rPr>
               <a:t>Adam </a:t>
             </a:r>
-            <a:endParaRPr lang="en-GB" sz="2000" dirty="0">
+            <a:endParaRPr lang="en-GB" sz="3000" dirty="0">
               <a:solidFill>
                 <a:prstClr val="black"/>
               </a:solidFill>
@@ -5552,7 +5937,7 @@
         <p:spPr>
           <a:xfrm>
             <a:off x="696000" y="729000"/>
-            <a:ext cx="10800000" cy="2092881"/>
+            <a:ext cx="10800000" cy="3877985"/>
           </a:xfrm>
           <a:prstGeom prst="rect">
             <a:avLst/>
@@ -5632,15 +6017,205 @@
           </a:p>
           <a:p>
             <a:r>
-              <a:rPr lang="en-US" sz="3000" dirty="0">
-                <a:solidFill>
-                  <a:prstClr val="black"/>
-                </a:solidFill>
-                <a:latin typeface="Atkinson Hyperlegible" pitchFamily="50" charset="0"/>
-                <a:ea typeface="+mj-ea"/>
-                <a:cs typeface="+mj-cs"/>
-              </a:rPr>
-              <a:t>Write a function to determine who ate the most fruit ⍵ on weekdays ⍺</a:t>
+              <a:rPr lang="en-US" sz="2200" dirty="0">
+                <a:solidFill>
+                  <a:prstClr val="black"/>
+                </a:solidFill>
+                <a:latin typeface="Atkinson Hyperlegible" pitchFamily="50" charset="0"/>
+                <a:ea typeface="+mj-ea"/>
+                <a:cs typeface="+mj-cs"/>
+              </a:rPr>
+              <a:t>Write a function </a:t>
+            </a:r>
+            <a:r>
+              <a:rPr lang="en-US" sz="2200" dirty="0" err="1">
+                <a:solidFill>
+                  <a:prstClr val="black"/>
+                </a:solidFill>
+                <a:latin typeface="APL385 Unicode" panose="020B0709000202000203" pitchFamily="49" charset="0"/>
+                <a:ea typeface="+mj-ea"/>
+                <a:cs typeface="+mj-cs"/>
+              </a:rPr>
+              <a:t>AteMostOnWeekdays</a:t>
+            </a:r>
+            <a:r>
+              <a:rPr lang="en-US" sz="2200" dirty="0">
+                <a:solidFill>
+                  <a:prstClr val="black"/>
+                </a:solidFill>
+                <a:latin typeface="Atkinson Hyperlegible" pitchFamily="50" charset="0"/>
+                <a:ea typeface="+mj-ea"/>
+                <a:cs typeface="+mj-cs"/>
+              </a:rPr>
+              <a:t> to determine who ate the most fruit </a:t>
+            </a:r>
+            <a:r>
+              <a:rPr lang="en-US" sz="2200" dirty="0">
+                <a:solidFill>
+                  <a:prstClr val="black"/>
+                </a:solidFill>
+                <a:latin typeface="APL385 Unicode" panose="020B0709000202000203" pitchFamily="49" charset="0"/>
+                <a:ea typeface="+mj-ea"/>
+                <a:cs typeface="+mj-cs"/>
+              </a:rPr>
+              <a:t>⍵</a:t>
+            </a:r>
+            <a:r>
+              <a:rPr lang="en-US" sz="2200" dirty="0">
+                <a:solidFill>
+                  <a:prstClr val="black"/>
+                </a:solidFill>
+                <a:latin typeface="Atkinson Hyperlegible" pitchFamily="50" charset="0"/>
+                <a:ea typeface="+mj-ea"/>
+                <a:cs typeface="+mj-cs"/>
+              </a:rPr>
+              <a:t> on weekdays </a:t>
+            </a:r>
+            <a:r>
+              <a:rPr lang="en-US" sz="2200" dirty="0">
+                <a:solidFill>
+                  <a:prstClr val="black"/>
+                </a:solidFill>
+                <a:latin typeface="APL385 Unicode" panose="020B0709000202000203" pitchFamily="49" charset="0"/>
+                <a:ea typeface="+mj-ea"/>
+                <a:cs typeface="+mj-cs"/>
+              </a:rPr>
+              <a:t>⍺</a:t>
+            </a:r>
+            <a:r>
+              <a:rPr lang="en-US" sz="2200" dirty="0">
+                <a:solidFill>
+                  <a:prstClr val="black"/>
+                </a:solidFill>
+                <a:latin typeface="Atkinson Hyperlegible" pitchFamily="2" charset="0"/>
+                <a:ea typeface="+mj-ea"/>
+                <a:cs typeface="+mj-cs"/>
+              </a:rPr>
+              <a:t>:</a:t>
+            </a:r>
+          </a:p>
+          <a:p>
+            <a:endParaRPr lang="en-US" sz="2200" dirty="0">
+              <a:solidFill>
+                <a:prstClr val="black"/>
+              </a:solidFill>
+              <a:latin typeface="APL385 Unicode" panose="020B0709000202000203" pitchFamily="49" charset="0"/>
+              <a:ea typeface="+mj-ea"/>
+              <a:cs typeface="+mj-cs"/>
+            </a:endParaRPr>
+          </a:p>
+          <a:p>
+            <a:endParaRPr lang="en-US" sz="2200" dirty="0">
+              <a:solidFill>
+                <a:prstClr val="black"/>
+              </a:solidFill>
+              <a:latin typeface="APL385 Unicode" panose="020B0709000202000203" pitchFamily="49" charset="0"/>
+              <a:ea typeface="+mj-ea"/>
+              <a:cs typeface="+mj-cs"/>
+            </a:endParaRPr>
+          </a:p>
+          <a:p>
+            <a:r>
+              <a:rPr lang="en-US" sz="2200" dirty="0">
+                <a:solidFill>
+                  <a:prstClr val="black"/>
+                </a:solidFill>
+                <a:latin typeface="APL385 Unicode" panose="020B0709000202000203" pitchFamily="49" charset="0"/>
+                <a:ea typeface="+mj-ea"/>
+                <a:cs typeface="+mj-cs"/>
+              </a:rPr>
+              <a:t>       (2 3⍴'WedTue') </a:t>
+            </a:r>
+            <a:r>
+              <a:rPr lang="en-US" sz="2200" dirty="0" err="1">
+                <a:solidFill>
+                  <a:prstClr val="black"/>
+                </a:solidFill>
+                <a:latin typeface="APL385 Unicode" panose="020B0709000202000203" pitchFamily="49" charset="0"/>
+                <a:ea typeface="+mj-ea"/>
+                <a:cs typeface="+mj-cs"/>
+              </a:rPr>
+              <a:t>AteMostOnWeekdays</a:t>
+            </a:r>
+            <a:r>
+              <a:rPr lang="en-US" sz="2200" dirty="0">
+                <a:solidFill>
+                  <a:prstClr val="black"/>
+                </a:solidFill>
+                <a:latin typeface="APL385 Unicode" panose="020B0709000202000203" pitchFamily="49" charset="0"/>
+                <a:ea typeface="+mj-ea"/>
+                <a:cs typeface="+mj-cs"/>
+              </a:rPr>
+              <a:t> 1 7⍴'Mangoes'</a:t>
+            </a:r>
+          </a:p>
+          <a:p>
+            <a:r>
+              <a:rPr lang="en-US" sz="2200" dirty="0">
+                <a:solidFill>
+                  <a:prstClr val="black"/>
+                </a:solidFill>
+                <a:latin typeface="APL385 Unicode" panose="020B0709000202000203" pitchFamily="49" charset="0"/>
+                <a:ea typeface="+mj-ea"/>
+                <a:cs typeface="+mj-cs"/>
+              </a:rPr>
+              <a:t>Rich</a:t>
+            </a:r>
+            <a:endParaRPr lang="en-US" sz="2000" dirty="0">
+              <a:solidFill>
+                <a:prstClr val="black"/>
+              </a:solidFill>
+              <a:latin typeface="APL385 Unicode" panose="020B0709000202000203" pitchFamily="49" charset="0"/>
+              <a:ea typeface="+mj-ea"/>
+              <a:cs typeface="+mj-cs"/>
+            </a:endParaRPr>
+          </a:p>
+          <a:p>
+            <a:r>
+              <a:rPr lang="en-US" sz="2200" dirty="0">
+                <a:solidFill>
+                  <a:prstClr val="black"/>
+                </a:solidFill>
+                <a:latin typeface="APL385 Unicode" panose="020B0709000202000203" pitchFamily="49" charset="0"/>
+                <a:ea typeface="+mj-ea"/>
+                <a:cs typeface="+mj-cs"/>
+              </a:rPr>
+              <a:t>       (3 3⍴'MonWedFri') </a:t>
+            </a:r>
+            <a:r>
+              <a:rPr lang="en-US" sz="2200" dirty="0" err="1">
+                <a:solidFill>
+                  <a:prstClr val="black"/>
+                </a:solidFill>
+                <a:latin typeface="APL385 Unicode" panose="020B0709000202000203" pitchFamily="49" charset="0"/>
+                <a:ea typeface="+mj-ea"/>
+                <a:cs typeface="+mj-cs"/>
+              </a:rPr>
+              <a:t>AteMostOnWeekdays</a:t>
+            </a:r>
+            <a:r>
+              <a:rPr lang="en-US" sz="2200" dirty="0">
+                <a:solidFill>
+                  <a:prstClr val="black"/>
+                </a:solidFill>
+                <a:latin typeface="APL385 Unicode" panose="020B0709000202000203" pitchFamily="49" charset="0"/>
+                <a:ea typeface="+mj-ea"/>
+                <a:cs typeface="+mj-cs"/>
+              </a:rPr>
+              <a:t> 2 7⍴'Apples Oranges'</a:t>
+            </a:r>
+          </a:p>
+          <a:p>
+            <a:r>
+              <a:rPr lang="en-US" sz="2200" dirty="0">
+                <a:solidFill>
+                  <a:prstClr val="black"/>
+                </a:solidFill>
+                <a:latin typeface="APL385 Unicode" panose="020B0709000202000203" pitchFamily="49" charset="0"/>
+                <a:ea typeface="+mj-ea"/>
+                <a:cs typeface="+mj-cs"/>
+              </a:rPr>
+              <a:t>Adam</a:t>
             </a:r>
           </a:p>
         </p:txBody>
@@ -5690,7 +6265,7 @@
         <p:spPr>
           <a:xfrm>
             <a:off x="696000" y="729000"/>
-            <a:ext cx="10800000" cy="2554545"/>
+            <a:ext cx="10800000" cy="3477875"/>
           </a:xfrm>
           <a:prstGeom prst="rect">
             <a:avLst/>
@@ -5770,19 +6345,85 @@
           </a:p>
           <a:p>
             <a:r>
-              <a:rPr lang="en-US" sz="3000" dirty="0">
-                <a:solidFill>
-                  <a:prstClr val="black"/>
-                </a:solidFill>
-                <a:latin typeface="Atkinson Hyperlegible" pitchFamily="50" charset="0"/>
-                <a:ea typeface="+mj-ea"/>
-                <a:cs typeface="+mj-cs"/>
-              </a:rPr>
-              <a:t>Write a function to determine the day on which people with names given in matrix ⍺ ate most of fruits given in matrix ⍵</a:t>
-            </a:r>
-          </a:p>
-          <a:p>
-            <a:endParaRPr lang="en-GB" sz="3000" dirty="0">
+              <a:rPr lang="en-US" sz="2400" dirty="0">
+                <a:solidFill>
+                  <a:prstClr val="black"/>
+                </a:solidFill>
+                <a:latin typeface="Atkinson Hyperlegible" pitchFamily="50" charset="0"/>
+                <a:ea typeface="+mj-ea"/>
+                <a:cs typeface="+mj-cs"/>
+              </a:rPr>
+              <a:t>Write a function </a:t>
+            </a:r>
+            <a:r>
+              <a:rPr lang="en-US" sz="2400" dirty="0" err="1">
+                <a:solidFill>
+                  <a:prstClr val="black"/>
+                </a:solidFill>
+                <a:latin typeface="APL385 Unicode" panose="020B0709000202000203" pitchFamily="49" charset="0"/>
+                <a:ea typeface="+mj-ea"/>
+                <a:cs typeface="+mj-cs"/>
+              </a:rPr>
+              <a:t>DayMostFruitEaten</a:t>
+            </a:r>
+            <a:r>
+              <a:rPr lang="en-US" sz="2400" dirty="0">
+                <a:solidFill>
+                  <a:prstClr val="black"/>
+                </a:solidFill>
+                <a:latin typeface="Atkinson Hyperlegible" pitchFamily="50" charset="0"/>
+                <a:ea typeface="+mj-ea"/>
+                <a:cs typeface="+mj-cs"/>
+              </a:rPr>
+              <a:t> to determine the day on which people with names given in matrix </a:t>
+            </a:r>
+            <a:r>
+              <a:rPr lang="en-US" sz="2400" dirty="0">
+                <a:solidFill>
+                  <a:prstClr val="black"/>
+                </a:solidFill>
+                <a:latin typeface="APL385 Unicode" panose="020B0709000202000203" pitchFamily="49" charset="0"/>
+                <a:ea typeface="+mj-ea"/>
+                <a:cs typeface="+mj-cs"/>
+              </a:rPr>
+              <a:t>⍺</a:t>
+            </a:r>
+            <a:r>
+              <a:rPr lang="en-US" sz="2400" dirty="0">
+                <a:solidFill>
+                  <a:prstClr val="black"/>
+                </a:solidFill>
+                <a:latin typeface="Atkinson Hyperlegible" pitchFamily="50" charset="0"/>
+                <a:ea typeface="+mj-ea"/>
+                <a:cs typeface="+mj-cs"/>
+              </a:rPr>
+              <a:t> ate most of fruits given in matrix </a:t>
+            </a:r>
+            <a:r>
+              <a:rPr lang="en-US" sz="2400" dirty="0">
+                <a:solidFill>
+                  <a:prstClr val="black"/>
+                </a:solidFill>
+                <a:latin typeface="APL385 Unicode" panose="020B0709000202000203" pitchFamily="49" charset="0"/>
+                <a:ea typeface="+mj-ea"/>
+                <a:cs typeface="+mj-cs"/>
+              </a:rPr>
+              <a:t>⍵</a:t>
+            </a:r>
+            <a:r>
+              <a:rPr lang="en-US" sz="2400" dirty="0">
+                <a:solidFill>
+                  <a:prstClr val="black"/>
+                </a:solidFill>
+                <a:latin typeface="Atkinson Hyperlegible" pitchFamily="50" charset="0"/>
+                <a:ea typeface="+mj-ea"/>
+                <a:cs typeface="+mj-cs"/>
+              </a:rPr>
+              <a:t>:</a:t>
+            </a:r>
+          </a:p>
+          <a:p>
+            <a:endParaRPr lang="en-GB" sz="2200" dirty="0">
               <a:solidFill>
                 <a:prstClr val="black"/>
               </a:solidFill>
@@ -5790,6 +6431,102 @@
               <a:ea typeface="+mj-ea"/>
               <a:cs typeface="+mj-cs"/>
             </a:endParaRPr>
+          </a:p>
+          <a:p>
+            <a:r>
+              <a:rPr lang="en-GB" sz="2000" dirty="0">
+                <a:solidFill>
+                  <a:prstClr val="black"/>
+                </a:solidFill>
+                <a:latin typeface="APL385 Unicode" panose="020B0709000202000203" pitchFamily="49" charset="0"/>
+                <a:ea typeface="+mj-ea"/>
+                <a:cs typeface="+mj-cs"/>
+              </a:rPr>
+              <a:t>      (2 7⍴'RodrigoRich   ') </a:t>
+            </a:r>
+            <a:r>
+              <a:rPr lang="en-GB" sz="2000" dirty="0" err="1">
+                <a:solidFill>
+                  <a:prstClr val="black"/>
+                </a:solidFill>
+                <a:latin typeface="APL385 Unicode" panose="020B0709000202000203" pitchFamily="49" charset="0"/>
+                <a:ea typeface="+mj-ea"/>
+                <a:cs typeface="+mj-cs"/>
+              </a:rPr>
+              <a:t>DayMostFruitEaten</a:t>
+            </a:r>
+            <a:r>
+              <a:rPr lang="en-GB" sz="2000" dirty="0">
+                <a:solidFill>
+                  <a:prstClr val="black"/>
+                </a:solidFill>
+                <a:latin typeface="APL385 Unicode" panose="020B0709000202000203" pitchFamily="49" charset="0"/>
+                <a:ea typeface="+mj-ea"/>
+                <a:cs typeface="+mj-cs"/>
+              </a:rPr>
+              <a:t> 2 7⍴'OrangesMangoes'</a:t>
+            </a:r>
+          </a:p>
+          <a:p>
+            <a:r>
+              <a:rPr lang="en-GB" sz="2000" dirty="0">
+                <a:solidFill>
+                  <a:prstClr val="black"/>
+                </a:solidFill>
+                <a:latin typeface="APL385 Unicode" panose="020B0709000202000203" pitchFamily="49" charset="0"/>
+                <a:ea typeface="+mj-ea"/>
+                <a:cs typeface="+mj-cs"/>
+              </a:rPr>
+              <a:t>Wed</a:t>
+            </a:r>
+          </a:p>
+          <a:p>
+            <a:r>
+              <a:rPr lang="en-GB" sz="2000" dirty="0">
+                <a:solidFill>
+                  <a:prstClr val="black"/>
+                </a:solidFill>
+                <a:latin typeface="APL385 Unicode" panose="020B0709000202000203" pitchFamily="49" charset="0"/>
+                <a:ea typeface="+mj-ea"/>
+                <a:cs typeface="+mj-cs"/>
+              </a:rPr>
+              <a:t>      names </a:t>
+            </a:r>
+            <a:r>
+              <a:rPr lang="en-GB" sz="2000" dirty="0" err="1">
+                <a:solidFill>
+                  <a:prstClr val="black"/>
+                </a:solidFill>
+                <a:latin typeface="APL385 Unicode" panose="020B0709000202000203" pitchFamily="49" charset="0"/>
+                <a:ea typeface="+mj-ea"/>
+                <a:cs typeface="+mj-cs"/>
+              </a:rPr>
+              <a:t>DayMostFruitEaten</a:t>
+            </a:r>
+            <a:r>
+              <a:rPr lang="en-GB" sz="2000" dirty="0">
+                <a:solidFill>
+                  <a:prstClr val="black"/>
+                </a:solidFill>
+                <a:latin typeface="APL385 Unicode" panose="020B0709000202000203" pitchFamily="49" charset="0"/>
+                <a:ea typeface="+mj-ea"/>
+                <a:cs typeface="+mj-cs"/>
+              </a:rPr>
+              <a:t> fruits</a:t>
+            </a:r>
+          </a:p>
+          <a:p>
+            <a:r>
+              <a:rPr lang="en-GB" sz="2000" dirty="0">
+                <a:solidFill>
+                  <a:prstClr val="black"/>
+                </a:solidFill>
+                <a:latin typeface="APL385 Unicode" panose="020B0709000202000203" pitchFamily="49" charset="0"/>
+                <a:ea typeface="+mj-ea"/>
+                <a:cs typeface="+mj-cs"/>
+              </a:rPr>
+              <a:t>Tue</a:t>
+            </a:r>
           </a:p>
         </p:txBody>
       </p:sp>
@@ -5917,7 +6654,29 @@
                 <a:ea typeface="+mj-ea"/>
                 <a:cs typeface="+mj-cs"/>
               </a:rPr>
-              <a:t>Create a character vector called "task2"</a:t>
+              <a:t>Create a character vector called "</a:t>
+            </a:r>
+            <a:r>
+              <a:rPr lang="en-GB" sz="2400" dirty="0">
+                <a:solidFill>
+                  <a:prstClr val="black"/>
+                </a:solidFill>
+                <a:latin typeface="APL385 Unicode" panose="020B0709000202000203" pitchFamily="49" charset="0"/>
+                <a:ea typeface="+mj-ea"/>
+                <a:cs typeface="+mj-cs"/>
+              </a:rPr>
+              <a:t>task2</a:t>
+            </a:r>
+            <a:r>
+              <a:rPr lang="en-GB" sz="2400" dirty="0">
+                <a:solidFill>
+                  <a:prstClr val="black"/>
+                </a:solidFill>
+                <a:latin typeface="Atkinson Hyperlegible" pitchFamily="50" charset="0"/>
+                <a:ea typeface="+mj-ea"/>
+                <a:cs typeface="+mj-cs"/>
+              </a:rPr>
+              <a:t>"</a:t>
             </a:r>
           </a:p>
           <a:p>
@@ -6223,7 +6982,7 @@
         <p:spPr>
           <a:xfrm>
             <a:off x="696000" y="729000"/>
-            <a:ext cx="10800000" cy="3293209"/>
+            <a:ext cx="10800000" cy="3847207"/>
           </a:xfrm>
           <a:prstGeom prst="rect">
             <a:avLst/>
@@ -6300,19 +7059,41 @@
           </a:p>
           <a:p>
             <a:r>
-              <a:rPr lang="en-GB" sz="2400" dirty="0">
-                <a:solidFill>
-                  <a:prstClr val="black"/>
-                </a:solidFill>
-                <a:latin typeface="Atkinson Hyperlegible" pitchFamily="50" charset="0"/>
-                <a:ea typeface="+mj-ea"/>
-                <a:cs typeface="+mj-cs"/>
-              </a:rPr>
-              <a:t>Write a function Upper to convert a word into upper case.</a:t>
-            </a:r>
-          </a:p>
-          <a:p>
-            <a:endParaRPr lang="en-GB" sz="2400" dirty="0">
+              <a:rPr lang="en-GB" sz="3000" dirty="0">
+                <a:solidFill>
+                  <a:prstClr val="black"/>
+                </a:solidFill>
+                <a:latin typeface="Atkinson Hyperlegible" pitchFamily="50" charset="0"/>
+                <a:ea typeface="+mj-ea"/>
+                <a:cs typeface="+mj-cs"/>
+              </a:rPr>
+              <a:t>Write a function </a:t>
+            </a:r>
+            <a:r>
+              <a:rPr lang="en-GB" sz="3000" dirty="0">
+                <a:solidFill>
+                  <a:prstClr val="black"/>
+                </a:solidFill>
+                <a:latin typeface="APL385 Unicode" panose="020B0709000202000203" pitchFamily="49" charset="0"/>
+                <a:ea typeface="+mj-ea"/>
+                <a:cs typeface="+mj-cs"/>
+              </a:rPr>
+              <a:t>Upper</a:t>
+            </a:r>
+            <a:r>
+              <a:rPr lang="en-GB" sz="3000" dirty="0">
+                <a:solidFill>
+                  <a:prstClr val="black"/>
+                </a:solidFill>
+                <a:latin typeface="Atkinson Hyperlegible" pitchFamily="50" charset="0"/>
+                <a:ea typeface="+mj-ea"/>
+                <a:cs typeface="+mj-cs"/>
+              </a:rPr>
+              <a:t> to convert a word into upper case.</a:t>
+            </a:r>
+          </a:p>
+          <a:p>
+            <a:endParaRPr lang="en-GB" sz="3000" dirty="0">
               <a:solidFill>
                 <a:prstClr val="black"/>
               </a:solidFill>
@@ -6323,7 +7104,7 @@
           </a:p>
           <a:p>
             <a:r>
-              <a:rPr lang="en-US" sz="2400" dirty="0">
+              <a:rPr lang="en-US" sz="3000" dirty="0">
                 <a:solidFill>
                   <a:prstClr val="black"/>
                 </a:solidFill>
@@ -6334,7 +7115,7 @@
               <a:t>      Upper '</a:t>
             </a:r>
             <a:r>
-              <a:rPr lang="en-US" sz="2400" dirty="0" err="1">
+              <a:rPr lang="en-US" sz="3000" dirty="0" err="1">
                 <a:solidFill>
                   <a:prstClr val="black"/>
                 </a:solidFill>
@@ -6345,7 +7126,7 @@
               <a:t>apl</a:t>
             </a:r>
             <a:r>
-              <a:rPr lang="en-US" sz="2400" dirty="0">
+              <a:rPr lang="en-US" sz="3000" dirty="0">
                 <a:solidFill>
                   <a:prstClr val="black"/>
                 </a:solidFill>
@@ -6358,7 +7139,7 @@
           </a:p>
           <a:p>
             <a:r>
-              <a:rPr lang="en-US" sz="2400" dirty="0">
+              <a:rPr lang="en-US" sz="3000" dirty="0">
                 <a:solidFill>
                   <a:prstClr val="black"/>
                 </a:solidFill>
@@ -6371,7 +7152,7 @@
           </a:p>
           <a:p>
             <a:r>
-              <a:rPr lang="en-US" sz="2400" dirty="0">
+              <a:rPr lang="en-US" sz="3000" dirty="0">
                 <a:solidFill>
                   <a:prstClr val="black"/>
                 </a:solidFill>
@@ -6384,7 +7165,7 @@
           </a:p>
           <a:p>
             <a:r>
-              <a:rPr lang="en-US" sz="2400" dirty="0">
+              <a:rPr lang="en-US" sz="3000" dirty="0">
                 <a:solidFill>
                   <a:prstClr val="black"/>
                 </a:solidFill>
@@ -6442,7 +7223,7 @@
         <p:spPr>
           <a:xfrm>
             <a:off x="696000" y="729000"/>
-            <a:ext cx="10800000" cy="4031873"/>
+            <a:ext cx="10800000" cy="4770537"/>
           </a:xfrm>
           <a:prstGeom prst="rect">
             <a:avLst/>
@@ -6519,19 +7300,41 @@
           </a:p>
           <a:p>
             <a:r>
-              <a:rPr lang="en-GB" sz="2400" dirty="0">
-                <a:solidFill>
-                  <a:prstClr val="black"/>
-                </a:solidFill>
-                <a:latin typeface="Atkinson Hyperlegible" pitchFamily="50" charset="0"/>
-                <a:ea typeface="+mj-ea"/>
-                <a:cs typeface="+mj-cs"/>
-              </a:rPr>
-              <a:t>Write a function Clean that changes all non-digits into stars:</a:t>
-            </a:r>
-          </a:p>
-          <a:p>
-            <a:endParaRPr lang="en-GB" sz="2400" dirty="0">
+              <a:rPr lang="en-GB" sz="3000" dirty="0">
+                <a:solidFill>
+                  <a:prstClr val="black"/>
+                </a:solidFill>
+                <a:latin typeface="Atkinson Hyperlegible" pitchFamily="50" charset="0"/>
+                <a:ea typeface="+mj-ea"/>
+                <a:cs typeface="+mj-cs"/>
+              </a:rPr>
+              <a:t>Write a function </a:t>
+            </a:r>
+            <a:r>
+              <a:rPr lang="en-GB" sz="3000" dirty="0">
+                <a:solidFill>
+                  <a:prstClr val="black"/>
+                </a:solidFill>
+                <a:latin typeface="APL385 Unicode" panose="020B0709000202000203" pitchFamily="49" charset="0"/>
+                <a:ea typeface="+mj-ea"/>
+                <a:cs typeface="+mj-cs"/>
+              </a:rPr>
+              <a:t>Clean</a:t>
+            </a:r>
+            <a:r>
+              <a:rPr lang="en-GB" sz="3000" dirty="0">
+                <a:solidFill>
+                  <a:prstClr val="black"/>
+                </a:solidFill>
+                <a:latin typeface="Atkinson Hyperlegible" pitchFamily="50" charset="0"/>
+                <a:ea typeface="+mj-ea"/>
+                <a:cs typeface="+mj-cs"/>
+              </a:rPr>
+              <a:t> that changes all non-digits into stars:</a:t>
+            </a:r>
+          </a:p>
+          <a:p>
+            <a:endParaRPr lang="en-GB" sz="3000" dirty="0">
               <a:solidFill>
                 <a:prstClr val="black"/>
               </a:solidFill>
@@ -6542,7 +7345,7 @@
           </a:p>
           <a:p>
             <a:r>
-              <a:rPr lang="en-US" sz="2400" dirty="0">
+              <a:rPr lang="en-US" sz="3000" dirty="0">
                 <a:solidFill>
                   <a:prstClr val="black"/>
                 </a:solidFill>
@@ -6555,7 +7358,7 @@
           </a:p>
           <a:p>
             <a:r>
-              <a:rPr lang="en-US" sz="2400" dirty="0">
+              <a:rPr lang="en-US" sz="3000" dirty="0">
                 <a:solidFill>
                   <a:prstClr val="black"/>
                 </a:solidFill>
@@ -6568,7 +7371,7 @@
           </a:p>
           <a:p>
             <a:r>
-              <a:rPr lang="en-US" sz="2400" dirty="0">
+              <a:rPr lang="en-US" sz="3000" dirty="0">
                 <a:solidFill>
                   <a:prstClr val="black"/>
                 </a:solidFill>
@@ -6581,7 +7384,7 @@
           </a:p>
           <a:p>
             <a:r>
-              <a:rPr lang="en-US" sz="2400" dirty="0">
+              <a:rPr lang="en-US" sz="3000" dirty="0">
                 <a:solidFill>
                   <a:prstClr val="black"/>
                 </a:solidFill>
@@ -6594,7 +7397,7 @@
           </a:p>
           <a:p>
             <a:r>
-              <a:rPr lang="en-US" sz="2400" dirty="0">
+              <a:rPr lang="en-US" sz="3000" dirty="0">
                 <a:solidFill>
                   <a:prstClr val="black"/>
                 </a:solidFill>
@@ -6607,7 +7410,7 @@
           </a:p>
           <a:p>
             <a:r>
-              <a:rPr lang="en-US" sz="2400" dirty="0">
+              <a:rPr lang="en-US" sz="3000" dirty="0">
                 <a:solidFill>
                   <a:prstClr val="black"/>
                 </a:solidFill>
@@ -6665,7 +7468,7 @@
         <p:spPr>
           <a:xfrm>
             <a:off x="696000" y="729000"/>
-            <a:ext cx="10800000" cy="3662541"/>
+            <a:ext cx="10800000" cy="4308872"/>
           </a:xfrm>
           <a:prstGeom prst="rect">
             <a:avLst/>
@@ -6745,19 +7548,41 @@
           </a:p>
           <a:p>
             <a:r>
-              <a:rPr lang="en-GB" sz="2400" dirty="0">
-                <a:solidFill>
-                  <a:prstClr val="black"/>
-                </a:solidFill>
-                <a:latin typeface="Atkinson Hyperlegible" pitchFamily="50" charset="0"/>
-                <a:ea typeface="+mj-ea"/>
-                <a:cs typeface="+mj-cs"/>
-              </a:rPr>
-              <a:t>Rewrite Upper to convert any character vector into upper case, even if the text contains spaces and punctuation:</a:t>
-            </a:r>
-          </a:p>
-          <a:p>
-            <a:endParaRPr lang="en-GB" sz="2400" dirty="0">
+              <a:rPr lang="en-GB" sz="3000" dirty="0">
+                <a:solidFill>
+                  <a:prstClr val="black"/>
+                </a:solidFill>
+                <a:latin typeface="Atkinson Hyperlegible" pitchFamily="50" charset="0"/>
+                <a:ea typeface="+mj-ea"/>
+                <a:cs typeface="+mj-cs"/>
+              </a:rPr>
+              <a:t>Rewrite </a:t>
+            </a:r>
+            <a:r>
+              <a:rPr lang="en-GB" sz="3000" dirty="0">
+                <a:solidFill>
+                  <a:prstClr val="black"/>
+                </a:solidFill>
+                <a:latin typeface="APL385 Unicode" panose="020B0709000202000203" pitchFamily="49" charset="0"/>
+                <a:ea typeface="+mj-ea"/>
+                <a:cs typeface="+mj-cs"/>
+              </a:rPr>
+              <a:t>Upper</a:t>
+            </a:r>
+            <a:r>
+              <a:rPr lang="en-GB" sz="3000" dirty="0">
+                <a:solidFill>
+                  <a:prstClr val="black"/>
+                </a:solidFill>
+                <a:latin typeface="Atkinson Hyperlegible" pitchFamily="50" charset="0"/>
+                <a:ea typeface="+mj-ea"/>
+                <a:cs typeface="+mj-cs"/>
+              </a:rPr>
+              <a:t> to convert any character vector into upper case, even if the text contains spaces and punctuation:</a:t>
+            </a:r>
+          </a:p>
+          <a:p>
+            <a:endParaRPr lang="en-GB" sz="3000" dirty="0">
               <a:solidFill>
                 <a:prstClr val="black"/>
               </a:solidFill>
@@ -6768,7 +7593,7 @@
           </a:p>
           <a:p>
             <a:r>
-              <a:rPr lang="en-US" sz="2400" dirty="0">
+              <a:rPr lang="en-US" sz="3000" dirty="0">
                 <a:solidFill>
                   <a:prstClr val="black"/>
                 </a:solidFill>
@@ -6779,7 +7604,7 @@
               <a:t>      Upper '</a:t>
             </a:r>
             <a:r>
-              <a:rPr lang="en-US" sz="2400" dirty="0" err="1">
+              <a:rPr lang="en-US" sz="3000" dirty="0" err="1">
                 <a:solidFill>
                   <a:prstClr val="black"/>
                 </a:solidFill>
@@ -6790,7 +7615,7 @@
               <a:t>apl</a:t>
             </a:r>
             <a:r>
-              <a:rPr lang="en-US" sz="2400" dirty="0">
+              <a:rPr lang="en-US" sz="3000" dirty="0">
                 <a:solidFill>
                   <a:prstClr val="black"/>
                 </a:solidFill>
@@ -6803,7 +7628,7 @@
           </a:p>
           <a:p>
             <a:r>
-              <a:rPr lang="en-US" sz="2400" dirty="0">
+              <a:rPr lang="en-US" sz="3000" dirty="0">
                 <a:solidFill>
                   <a:prstClr val="black"/>
                 </a:solidFill>
@@ -6816,7 +7641,7 @@
           </a:p>
           <a:p>
             <a:r>
-              <a:rPr lang="en-US" sz="2400" dirty="0">
+              <a:rPr lang="en-US" sz="3000" dirty="0">
                 <a:solidFill>
                   <a:prstClr val="black"/>
                 </a:solidFill>
@@ -6829,7 +7654,7 @@
           </a:p>
           <a:p>
             <a:r>
-              <a:rPr lang="en-US" sz="2400" dirty="0">
+              <a:rPr lang="en-US" sz="3000" dirty="0">
                 <a:solidFill>
                   <a:prstClr val="black"/>
                 </a:solidFill>
@@ -6887,7 +7712,7 @@
         <p:spPr>
           <a:xfrm>
             <a:off x="696000" y="729000"/>
-            <a:ext cx="10800000" cy="4124206"/>
+            <a:ext cx="10800000" cy="4739759"/>
           </a:xfrm>
           <a:prstGeom prst="rect">
             <a:avLst/>
@@ -6953,6 +7778,16 @@
             </a:endParaRPr>
           </a:p>
           <a:p>
+            <a:endParaRPr lang="en-GB" sz="4000" b="1" dirty="0">
+              <a:solidFill>
+                <a:prstClr val="black"/>
+              </a:solidFill>
+              <a:latin typeface="Atkinson Hyperlegible" pitchFamily="50" charset="0"/>
+              <a:ea typeface="+mj-ea"/>
+              <a:cs typeface="+mj-cs"/>
+            </a:endParaRPr>
+          </a:p>
+          <a:p>
             <a:r>
               <a:rPr lang="en-GB" sz="3000" dirty="0">
                 <a:solidFill>
@@ -6965,11 +7800,11 @@
               <a:t>Define a function </a:t>
             </a:r>
             <a:r>
-              <a:rPr lang="en-GB" sz="3000" dirty="0" err="1">
-                <a:solidFill>
-                  <a:prstClr val="black"/>
-                </a:solidFill>
-                <a:latin typeface="Atkinson Hyperlegible" pitchFamily="50" charset="0"/>
+              <a:rPr lang="en-GB" sz="2400" dirty="0" err="1">
+                <a:solidFill>
+                  <a:prstClr val="black"/>
+                </a:solidFill>
+                <a:latin typeface="APL385 Unicode" panose="020B0709000202000203" pitchFamily="49" charset="0"/>
                 <a:ea typeface="+mj-ea"/>
                 <a:cs typeface="+mj-cs"/>
               </a:rPr>
@@ -6984,7 +7819,18 @@
                 <a:ea typeface="+mj-ea"/>
                 <a:cs typeface="+mj-cs"/>
               </a:rPr>
-              <a:t> to count the number of vowels in the character vector ⍵</a:t>
+              <a:t> to count the number of vowels in the character vector </a:t>
+            </a:r>
+            <a:r>
+              <a:rPr lang="en-GB" sz="2400" dirty="0">
+                <a:solidFill>
+                  <a:prstClr val="black"/>
+                </a:solidFill>
+                <a:latin typeface="APL385 Unicode" panose="020B0709000202000203" pitchFamily="49" charset="0"/>
+                <a:ea typeface="+mj-ea"/>
+                <a:cs typeface="+mj-cs"/>
+              </a:rPr>
+              <a:t>⍵</a:t>
             </a:r>
           </a:p>
           <a:p>
@@ -7218,7 +8064,7 @@
         <p:spPr>
           <a:xfrm>
             <a:off x="696000" y="729000"/>
-            <a:ext cx="10800000" cy="5693866"/>
+            <a:ext cx="10800000" cy="5878532"/>
           </a:xfrm>
           <a:prstGeom prst="rect">
             <a:avLst/>
@@ -7284,42 +8130,7 @@
             </a:endParaRPr>
           </a:p>
           <a:p>
-            <a:r>
-              <a:rPr lang="en-GB" sz="3000" dirty="0">
-                <a:solidFill>
-                  <a:prstClr val="black"/>
-                </a:solidFill>
-                <a:latin typeface="Atkinson Hyperlegible" pitchFamily="50" charset="0"/>
-                <a:ea typeface="+mj-ea"/>
-                <a:cs typeface="+mj-cs"/>
-              </a:rPr>
-              <a:t>Define a function </a:t>
-            </a:r>
-            <a:r>
-              <a:rPr lang="en-GB" sz="3000" dirty="0" err="1">
-                <a:solidFill>
-                  <a:prstClr val="black"/>
-                </a:solidFill>
-                <a:latin typeface="APL385 Unicode" panose="020B0709000202000203" pitchFamily="49" charset="0"/>
-                <a:ea typeface="+mj-ea"/>
-                <a:cs typeface="+mj-cs"/>
-              </a:rPr>
-              <a:t>RowEquals</a:t>
-            </a:r>
-            <a:r>
-              <a:rPr lang="en-GB" sz="3000" dirty="0">
-                <a:solidFill>
-                  <a:prstClr val="black"/>
-                </a:solidFill>
-                <a:latin typeface="Atkinson Hyperlegible" pitchFamily="50" charset="0"/>
-                <a:ea typeface="+mj-ea"/>
-                <a:cs typeface="+mj-cs"/>
-              </a:rPr>
-              <a:t> to locate the vector ⍺ in the matrix ⍵ </a:t>
-            </a:r>
-          </a:p>
-          <a:p>
-            <a:endParaRPr lang="en-GB" sz="2200" dirty="0">
+            <a:endParaRPr lang="en-GB" sz="2400" dirty="0">
               <a:solidFill>
                 <a:prstClr val="black"/>
               </a:solidFill>
@@ -7330,31 +8141,18 @@
           </a:p>
           <a:p>
             <a:r>
-              <a:rPr lang="en-GB" sz="2200" dirty="0">
-                <a:solidFill>
-                  <a:prstClr val="black"/>
-                </a:solidFill>
-                <a:latin typeface="APL385 Unicode" panose="020B0709000202000203" pitchFamily="49" charset="0"/>
-                <a:ea typeface="+mj-ea"/>
-                <a:cs typeface="+mj-cs"/>
-              </a:rPr>
-              <a:t>      text ← 3 5⍴'GREATGIANTTIGER'</a:t>
-            </a:r>
-          </a:p>
-          <a:p>
-            <a:r>
-              <a:rPr lang="en-GB" sz="2200" dirty="0">
-                <a:solidFill>
-                  <a:prstClr val="black"/>
-                </a:solidFill>
-                <a:latin typeface="APL385 Unicode" panose="020B0709000202000203" pitchFamily="49" charset="0"/>
-                <a:ea typeface="+mj-ea"/>
-                <a:cs typeface="+mj-cs"/>
-              </a:rPr>
-              <a:t>      'TIGER' </a:t>
-            </a:r>
-            <a:r>
-              <a:rPr lang="en-GB" sz="2200" dirty="0" err="1">
+              <a:rPr lang="en-GB" sz="2400" dirty="0">
+                <a:solidFill>
+                  <a:prstClr val="black"/>
+                </a:solidFill>
+                <a:latin typeface="Atkinson Hyperlegible" pitchFamily="50" charset="0"/>
+                <a:ea typeface="+mj-ea"/>
+                <a:cs typeface="+mj-cs"/>
+              </a:rPr>
+              <a:t>Define a function </a:t>
+            </a:r>
+            <a:r>
+              <a:rPr lang="en-GB" sz="2400" dirty="0" err="1">
                 <a:solidFill>
                   <a:prstClr val="black"/>
                 </a:solidFill>
@@ -7365,80 +8163,63 @@
               <a:t>RowEquals</a:t>
             </a:r>
             <a:r>
-              <a:rPr lang="en-GB" sz="2200" dirty="0">
-                <a:solidFill>
-                  <a:prstClr val="black"/>
-                </a:solidFill>
-                <a:latin typeface="APL385 Unicode" panose="020B0709000202000203" pitchFamily="49" charset="0"/>
-                <a:ea typeface="+mj-ea"/>
-                <a:cs typeface="+mj-cs"/>
-              </a:rPr>
-              <a:t> text</a:t>
-            </a:r>
-          </a:p>
-          <a:p>
-            <a:r>
-              <a:rPr lang="en-GB" sz="2200" dirty="0">
-                <a:solidFill>
-                  <a:prstClr val="black"/>
-                </a:solidFill>
-                <a:latin typeface="APL385 Unicode" panose="020B0709000202000203" pitchFamily="49" charset="0"/>
-                <a:ea typeface="+mj-ea"/>
-                <a:cs typeface="+mj-cs"/>
-              </a:rPr>
-              <a:t>0 0 1</a:t>
-            </a:r>
-          </a:p>
-          <a:p>
-            <a:r>
-              <a:rPr lang="en-GB" sz="2200" dirty="0">
-                <a:solidFill>
-                  <a:prstClr val="black"/>
-                </a:solidFill>
-                <a:latin typeface="APL385 Unicode" panose="020B0709000202000203" pitchFamily="49" charset="0"/>
-                <a:ea typeface="+mj-ea"/>
-                <a:cs typeface="+mj-cs"/>
-              </a:rPr>
-              <a:t>      'GREAT' </a:t>
-            </a:r>
-            <a:r>
-              <a:rPr lang="en-GB" sz="2200" dirty="0" err="1">
-                <a:solidFill>
-                  <a:prstClr val="black"/>
-                </a:solidFill>
-                <a:latin typeface="APL385 Unicode" panose="020B0709000202000203" pitchFamily="49" charset="0"/>
-                <a:ea typeface="+mj-ea"/>
-                <a:cs typeface="+mj-cs"/>
-              </a:rPr>
-              <a:t>RowEquals</a:t>
-            </a:r>
-            <a:r>
-              <a:rPr lang="en-GB" sz="2200" dirty="0">
-                <a:solidFill>
-                  <a:prstClr val="black"/>
-                </a:solidFill>
-                <a:latin typeface="APL385 Unicode" panose="020B0709000202000203" pitchFamily="49" charset="0"/>
-                <a:ea typeface="+mj-ea"/>
-                <a:cs typeface="+mj-cs"/>
-              </a:rPr>
-              <a:t> text</a:t>
-            </a:r>
-          </a:p>
-          <a:p>
-            <a:r>
-              <a:rPr lang="en-GB" sz="2200" dirty="0">
-                <a:solidFill>
-                  <a:prstClr val="black"/>
-                </a:solidFill>
-                <a:latin typeface="APL385 Unicode" panose="020B0709000202000203" pitchFamily="49" charset="0"/>
-                <a:ea typeface="+mj-ea"/>
-                <a:cs typeface="+mj-cs"/>
-              </a:rPr>
-              <a:t>1 0 0</a:t>
-            </a:r>
-          </a:p>
-          <a:p>
-            <a:endParaRPr lang="en-GB" sz="2200" dirty="0">
+              <a:rPr lang="en-GB" sz="2400" dirty="0">
+                <a:solidFill>
+                  <a:prstClr val="black"/>
+                </a:solidFill>
+                <a:latin typeface="Atkinson Hyperlegible" pitchFamily="50" charset="0"/>
+                <a:ea typeface="+mj-ea"/>
+                <a:cs typeface="+mj-cs"/>
+              </a:rPr>
+              <a:t> to locate the vector </a:t>
+            </a:r>
+            <a:r>
+              <a:rPr lang="en-GB" sz="2400" dirty="0">
+                <a:solidFill>
+                  <a:prstClr val="black"/>
+                </a:solidFill>
+                <a:latin typeface="APL385 Unicode" panose="020B0709000202000203" pitchFamily="49" charset="0"/>
+                <a:ea typeface="+mj-ea"/>
+                <a:cs typeface="+mj-cs"/>
+              </a:rPr>
+              <a:t>⍺</a:t>
+            </a:r>
+            <a:r>
+              <a:rPr lang="en-GB" sz="2400" dirty="0">
+                <a:solidFill>
+                  <a:prstClr val="black"/>
+                </a:solidFill>
+                <a:latin typeface="Atkinson Hyperlegible" pitchFamily="50" charset="0"/>
+                <a:ea typeface="+mj-ea"/>
+                <a:cs typeface="+mj-cs"/>
+              </a:rPr>
+              <a:t> in the matrix </a:t>
+            </a:r>
+            <a:r>
+              <a:rPr lang="en-GB" sz="2400" dirty="0">
+                <a:solidFill>
+                  <a:prstClr val="black"/>
+                </a:solidFill>
+                <a:latin typeface="APL385 Unicode" panose="020B0709000202000203" pitchFamily="49" charset="0"/>
+                <a:ea typeface="+mj-ea"/>
+                <a:cs typeface="+mj-cs"/>
+              </a:rPr>
+              <a:t>⍵</a:t>
+            </a:r>
+            <a:r>
+              <a:rPr lang="en-GB" sz="2400" dirty="0">
+                <a:solidFill>
+                  <a:prstClr val="black"/>
+                </a:solidFill>
+                <a:latin typeface="Atkinson Hyperlegible" pitchFamily="50" charset="0"/>
+                <a:ea typeface="+mj-ea"/>
+                <a:cs typeface="+mj-cs"/>
+              </a:rPr>
+              <a:t> </a:t>
+            </a:r>
+          </a:p>
+          <a:p>
+            <a:endParaRPr lang="en-GB" sz="2400" dirty="0">
               <a:solidFill>
                 <a:prstClr val="black"/>
               </a:solidFill>
@@ -7449,7 +8230,126 @@
           </a:p>
           <a:p>
             <a:r>
-              <a:rPr lang="en-GB" sz="2200" dirty="0">
+              <a:rPr lang="en-GB" sz="2400" dirty="0">
+                <a:solidFill>
+                  <a:prstClr val="black"/>
+                </a:solidFill>
+                <a:latin typeface="APL385 Unicode" panose="020B0709000202000203" pitchFamily="49" charset="0"/>
+                <a:ea typeface="+mj-ea"/>
+                <a:cs typeface="+mj-cs"/>
+              </a:rPr>
+              <a:t>      text ← 3 5⍴'GREATGIANTTIGER'</a:t>
+            </a:r>
+          </a:p>
+          <a:p>
+            <a:r>
+              <a:rPr lang="en-GB" sz="2400" dirty="0">
+                <a:solidFill>
+                  <a:prstClr val="black"/>
+                </a:solidFill>
+                <a:latin typeface="APL385 Unicode" panose="020B0709000202000203" pitchFamily="49" charset="0"/>
+                <a:ea typeface="+mj-ea"/>
+                <a:cs typeface="+mj-cs"/>
+              </a:rPr>
+              <a:t>      'TIGER' </a:t>
+            </a:r>
+            <a:r>
+              <a:rPr lang="en-GB" sz="2400" dirty="0" err="1">
+                <a:solidFill>
+                  <a:prstClr val="black"/>
+                </a:solidFill>
+                <a:latin typeface="APL385 Unicode" panose="020B0709000202000203" pitchFamily="49" charset="0"/>
+                <a:ea typeface="+mj-ea"/>
+                <a:cs typeface="+mj-cs"/>
+              </a:rPr>
+              <a:t>RowEquals</a:t>
+            </a:r>
+            <a:r>
+              <a:rPr lang="en-GB" sz="2400" dirty="0">
+                <a:solidFill>
+                  <a:prstClr val="black"/>
+                </a:solidFill>
+                <a:latin typeface="APL385 Unicode" panose="020B0709000202000203" pitchFamily="49" charset="0"/>
+                <a:ea typeface="+mj-ea"/>
+                <a:cs typeface="+mj-cs"/>
+              </a:rPr>
+              <a:t> text</a:t>
+            </a:r>
+          </a:p>
+          <a:p>
+            <a:r>
+              <a:rPr lang="en-GB" sz="2400" dirty="0">
+                <a:solidFill>
+                  <a:prstClr val="black"/>
+                </a:solidFill>
+                <a:latin typeface="APL385 Unicode" panose="020B0709000202000203" pitchFamily="49" charset="0"/>
+                <a:ea typeface="+mj-ea"/>
+                <a:cs typeface="+mj-cs"/>
+              </a:rPr>
+              <a:t>0 0 1</a:t>
+            </a:r>
+          </a:p>
+          <a:p>
+            <a:r>
+              <a:rPr lang="en-GB" sz="2400" dirty="0">
+                <a:solidFill>
+                  <a:prstClr val="black"/>
+                </a:solidFill>
+                <a:latin typeface="APL385 Unicode" panose="020B0709000202000203" pitchFamily="49" charset="0"/>
+                <a:ea typeface="+mj-ea"/>
+                <a:cs typeface="+mj-cs"/>
+              </a:rPr>
+              <a:t>      'GREAT' </a:t>
+            </a:r>
+            <a:r>
+              <a:rPr lang="en-GB" sz="2400" dirty="0" err="1">
+                <a:solidFill>
+                  <a:prstClr val="black"/>
+                </a:solidFill>
+                <a:latin typeface="APL385 Unicode" panose="020B0709000202000203" pitchFamily="49" charset="0"/>
+                <a:ea typeface="+mj-ea"/>
+                <a:cs typeface="+mj-cs"/>
+              </a:rPr>
+              <a:t>RowEquals</a:t>
+            </a:r>
+            <a:r>
+              <a:rPr lang="en-GB" sz="2400" dirty="0">
+                <a:solidFill>
+                  <a:prstClr val="black"/>
+                </a:solidFill>
+                <a:latin typeface="APL385 Unicode" panose="020B0709000202000203" pitchFamily="49" charset="0"/>
+                <a:ea typeface="+mj-ea"/>
+                <a:cs typeface="+mj-cs"/>
+              </a:rPr>
+              <a:t> text</a:t>
+            </a:r>
+          </a:p>
+          <a:p>
+            <a:r>
+              <a:rPr lang="en-GB" sz="2400" dirty="0">
+                <a:solidFill>
+                  <a:prstClr val="black"/>
+                </a:solidFill>
+                <a:latin typeface="APL385 Unicode" panose="020B0709000202000203" pitchFamily="49" charset="0"/>
+                <a:ea typeface="+mj-ea"/>
+                <a:cs typeface="+mj-cs"/>
+              </a:rPr>
+              <a:t>1 0 0</a:t>
+            </a:r>
+          </a:p>
+          <a:p>
+            <a:endParaRPr lang="en-GB" sz="2400" dirty="0">
+              <a:solidFill>
+                <a:prstClr val="black"/>
+              </a:solidFill>
+              <a:latin typeface="APL385 Unicode" panose="020B0709000202000203" pitchFamily="49" charset="0"/>
+              <a:ea typeface="+mj-ea"/>
+              <a:cs typeface="+mj-cs"/>
+            </a:endParaRPr>
+          </a:p>
+          <a:p>
+            <a:r>
+              <a:rPr lang="en-GB" sz="2400" dirty="0">
                 <a:solidFill>
                   <a:prstClr val="black"/>
                 </a:solidFill>
@@ -7462,7 +8362,7 @@
           </a:p>
           <a:p>
             <a:r>
-              <a:rPr lang="en-GB" sz="2200" dirty="0">
+              <a:rPr lang="en-GB" sz="2400" dirty="0">
                 <a:solidFill>
                   <a:prstClr val="black"/>
                 </a:solidFill>
@@ -7473,7 +8373,7 @@
               <a:t>      'Bananas' </a:t>
             </a:r>
             <a:r>
-              <a:rPr lang="en-GB" sz="2200" dirty="0" err="1">
+              <a:rPr lang="en-GB" sz="2400" dirty="0" err="1">
                 <a:solidFill>
                   <a:prstClr val="black"/>
                 </a:solidFill>
@@ -7484,7 +8384,7 @@
               <a:t>RowEquals</a:t>
             </a:r>
             <a:r>
-              <a:rPr lang="en-GB" sz="2200" dirty="0">
+              <a:rPr lang="en-GB" sz="2400" dirty="0">
                 <a:solidFill>
                   <a:prstClr val="black"/>
                 </a:solidFill>
@@ -7497,7 +8397,7 @@
           </a:p>
           <a:p>
             <a:r>
-              <a:rPr lang="en-GB" sz="2200" dirty="0">
+              <a:rPr lang="en-GB" sz="2400" dirty="0">
                 <a:solidFill>
                   <a:prstClr val="black"/>
                 </a:solidFill>
@@ -7510,7 +8410,7 @@
           </a:p>
           <a:p>
             <a:r>
-              <a:rPr lang="en-GB" sz="2200" dirty="0">
+              <a:rPr lang="en-GB" sz="2400" dirty="0">
                 <a:solidFill>
                   <a:prstClr val="black"/>
                 </a:solidFill>
@@ -7521,7 +8421,7 @@
               <a:t>      'Carrots' </a:t>
             </a:r>
             <a:r>
-              <a:rPr lang="en-GB" sz="2200" dirty="0" err="1">
+              <a:rPr lang="en-GB" sz="2400" dirty="0" err="1">
                 <a:solidFill>
                   <a:prstClr val="black"/>
                 </a:solidFill>
@@ -7532,7 +8432,7 @@
               <a:t>RowEquals</a:t>
             </a:r>
             <a:r>
-              <a:rPr lang="en-GB" sz="2200" dirty="0">
+              <a:rPr lang="en-GB" sz="2400" dirty="0">
                 <a:solidFill>
                   <a:prstClr val="black"/>
                 </a:solidFill>
@@ -7545,7 +8445,7 @@
           </a:p>
           <a:p>
             <a:r>
-              <a:rPr lang="en-GB" sz="2200" dirty="0">
+              <a:rPr lang="en-GB" sz="2400" dirty="0">
                 <a:solidFill>
                   <a:prstClr val="black"/>
                 </a:solidFill>
@@ -7603,7 +8503,7 @@
         <p:spPr>
           <a:xfrm>
             <a:off x="696000" y="729000"/>
-            <a:ext cx="10800000" cy="4985980"/>
+            <a:ext cx="10800000" cy="5786199"/>
           </a:xfrm>
           <a:prstGeom prst="rect">
             <a:avLst/>
@@ -7670,15 +8570,37 @@
           </a:p>
           <a:p>
             <a:r>
-              <a:rPr lang="en-GB" sz="2800" dirty="0">
-                <a:solidFill>
-                  <a:prstClr val="black"/>
-                </a:solidFill>
-                <a:latin typeface="Atkinson Hyperlegible" pitchFamily="50" charset="0"/>
-                <a:ea typeface="+mj-ea"/>
-                <a:cs typeface="+mj-cs"/>
-              </a:rPr>
-              <a:t>Define a function Up that accepts a vector of numbers and sorts them in increasing order:</a:t>
+              <a:rPr lang="en-GB" sz="3000" dirty="0">
+                <a:solidFill>
+                  <a:prstClr val="black"/>
+                </a:solidFill>
+                <a:latin typeface="Atkinson Hyperlegible" pitchFamily="50" charset="0"/>
+                <a:ea typeface="+mj-ea"/>
+                <a:cs typeface="+mj-cs"/>
+              </a:rPr>
+              <a:t>Define a function </a:t>
+            </a:r>
+            <a:r>
+              <a:rPr lang="en-GB" sz="3000" dirty="0">
+                <a:solidFill>
+                  <a:prstClr val="black"/>
+                </a:solidFill>
+                <a:latin typeface="APL385 Unicode" panose="020B0709000202000203" pitchFamily="49" charset="0"/>
+                <a:ea typeface="+mj-ea"/>
+                <a:cs typeface="+mj-cs"/>
+              </a:rPr>
+              <a:t>Up</a:t>
+            </a:r>
+            <a:r>
+              <a:rPr lang="en-GB" sz="3000" dirty="0">
+                <a:solidFill>
+                  <a:prstClr val="black"/>
+                </a:solidFill>
+                <a:latin typeface="Atkinson Hyperlegible" pitchFamily="50" charset="0"/>
+                <a:ea typeface="+mj-ea"/>
+                <a:cs typeface="+mj-cs"/>
+              </a:rPr>
+              <a:t> that accepts a vector of numbers and sorts them in increasing order:</a:t>
             </a:r>
           </a:p>
           <a:p>
@@ -7693,7 +8615,7 @@
           </a:p>
           <a:p>
             <a:r>
-              <a:rPr lang="en-US" sz="2200" dirty="0">
+              <a:rPr lang="en-US" sz="3000" dirty="0">
                 <a:solidFill>
                   <a:prstClr val="black"/>
                 </a:solidFill>
@@ -7706,7 +8628,7 @@
           </a:p>
           <a:p>
             <a:r>
-              <a:rPr lang="en-US" sz="2200" dirty="0">
+              <a:rPr lang="en-US" sz="3000" dirty="0">
                 <a:solidFill>
                   <a:prstClr val="black"/>
                 </a:solidFill>
@@ -7718,7 +8640,7 @@
             </a:r>
           </a:p>
           <a:p>
-            <a:endParaRPr lang="en-US" sz="2200" dirty="0">
+            <a:endParaRPr lang="en-US" sz="3000" dirty="0">
               <a:solidFill>
                 <a:prstClr val="black"/>
               </a:solidFill>
@@ -7729,7 +8651,7 @@
           </a:p>
           <a:p>
             <a:r>
-              <a:rPr lang="en-US" sz="2800" dirty="0">
+              <a:rPr lang="en-US" sz="3000" dirty="0">
                 <a:solidFill>
                   <a:prstClr val="black"/>
                 </a:solidFill>
@@ -7737,11 +8659,33 @@
                 <a:ea typeface="+mj-ea"/>
                 <a:cs typeface="+mj-cs"/>
               </a:rPr>
-              <a:t>Define a function Down that sorts the vector of numbers in decreasing order:</a:t>
-            </a:r>
-          </a:p>
-          <a:p>
-            <a:endParaRPr lang="en-US" sz="2200" dirty="0">
+              <a:t>Define a function </a:t>
+            </a:r>
+            <a:r>
+              <a:rPr lang="en-US" sz="3000" dirty="0">
+                <a:solidFill>
+                  <a:prstClr val="black"/>
+                </a:solidFill>
+                <a:latin typeface="APL385 Unicode" panose="020B0709000202000203" pitchFamily="49" charset="0"/>
+                <a:ea typeface="+mj-ea"/>
+                <a:cs typeface="+mj-cs"/>
+              </a:rPr>
+              <a:t>Down</a:t>
+            </a:r>
+            <a:r>
+              <a:rPr lang="en-US" sz="3000" dirty="0">
+                <a:solidFill>
+                  <a:prstClr val="black"/>
+                </a:solidFill>
+                <a:latin typeface="Atkinson Hyperlegible" pitchFamily="2" charset="0"/>
+                <a:ea typeface="+mj-ea"/>
+                <a:cs typeface="+mj-cs"/>
+              </a:rPr>
+              <a:t> that sorts the vector of numbers in decreasing order:</a:t>
+            </a:r>
+          </a:p>
+          <a:p>
+            <a:endParaRPr lang="en-US" sz="3000" dirty="0">
               <a:solidFill>
                 <a:prstClr val="black"/>
               </a:solidFill>
@@ -7752,7 +8696,7 @@
           </a:p>
           <a:p>
             <a:r>
-              <a:rPr lang="en-US" sz="2200" dirty="0">
+              <a:rPr lang="en-US" sz="3000" dirty="0">
                 <a:solidFill>
                   <a:prstClr val="black"/>
                 </a:solidFill>
@@ -7765,7 +8709,7 @@
           </a:p>
           <a:p>
             <a:r>
-              <a:rPr lang="en-US" sz="2200" dirty="0">
+              <a:rPr lang="en-US" sz="3000" dirty="0">
                 <a:solidFill>
                   <a:prstClr val="black"/>
                 </a:solidFill>
@@ -7775,7 +8719,7 @@
               </a:rPr>
               <a:t>10  4.2  1.5  0  ¯3</a:t>
             </a:r>
-            <a:endParaRPr lang="en-GB" sz="2200" dirty="0">
+            <a:endParaRPr lang="en-GB" sz="3000" dirty="0">
               <a:solidFill>
                 <a:prstClr val="black"/>
               </a:solidFill>
@@ -7831,7 +8775,7 @@
         <p:spPr>
           <a:xfrm>
             <a:off x="696000" y="729000"/>
-            <a:ext cx="10800000" cy="4862870"/>
+            <a:ext cx="10800000" cy="5478423"/>
           </a:xfrm>
           <a:prstGeom prst="rect">
             <a:avLst/>
@@ -7891,6 +8835,16 @@
               <a:effectLst/>
               <a:uLnTx/>
               <a:uFillTx/>
+              <a:latin typeface="Atkinson Hyperlegible" pitchFamily="50" charset="0"/>
+              <a:ea typeface="+mj-ea"/>
+              <a:cs typeface="+mj-cs"/>
+            </a:endParaRPr>
+          </a:p>
+          <a:p>
+            <a:endParaRPr lang="en-GB" sz="4000" b="1" dirty="0">
+              <a:solidFill>
+                <a:prstClr val="black"/>
+              </a:solidFill>
               <a:latin typeface="Atkinson Hyperlegible" pitchFamily="50" charset="0"/>
               <a:ea typeface="+mj-ea"/>
               <a:cs typeface="+mj-cs"/>

</xml_diff>

<commit_message>
fix task 13 etc. examples
</commit_message>
<xml_diff>
--- a/tasks5.pptx
+++ b/tasks5.pptx
@@ -276,7 +276,7 @@
           <a:p>
             <a:fld id="{4C324CBA-B5F8-49E4-A74D-FDDDFCEF0F4B}" type="datetimeFigureOut">
               <a:rPr lang="en-GB" smtClean="0"/>
-              <a:t>25/08/2021</a:t>
+              <a:t>29/08/2021</a:t>
             </a:fld>
             <a:endParaRPr lang="en-GB"/>
           </a:p>
@@ -476,7 +476,7 @@
           <a:p>
             <a:fld id="{4C324CBA-B5F8-49E4-A74D-FDDDFCEF0F4B}" type="datetimeFigureOut">
               <a:rPr lang="en-GB" smtClean="0"/>
-              <a:t>25/08/2021</a:t>
+              <a:t>29/08/2021</a:t>
             </a:fld>
             <a:endParaRPr lang="en-GB"/>
           </a:p>
@@ -686,7 +686,7 @@
           <a:p>
             <a:fld id="{4C324CBA-B5F8-49E4-A74D-FDDDFCEF0F4B}" type="datetimeFigureOut">
               <a:rPr lang="en-GB" smtClean="0"/>
-              <a:t>25/08/2021</a:t>
+              <a:t>29/08/2021</a:t>
             </a:fld>
             <a:endParaRPr lang="en-GB"/>
           </a:p>
@@ -886,7 +886,7 @@
           <a:p>
             <a:fld id="{4C324CBA-B5F8-49E4-A74D-FDDDFCEF0F4B}" type="datetimeFigureOut">
               <a:rPr lang="en-GB" smtClean="0"/>
-              <a:t>25/08/2021</a:t>
+              <a:t>29/08/2021</a:t>
             </a:fld>
             <a:endParaRPr lang="en-GB"/>
           </a:p>
@@ -1162,7 +1162,7 @@
           <a:p>
             <a:fld id="{4C324CBA-B5F8-49E4-A74D-FDDDFCEF0F4B}" type="datetimeFigureOut">
               <a:rPr lang="en-GB" smtClean="0"/>
-              <a:t>25/08/2021</a:t>
+              <a:t>29/08/2021</a:t>
             </a:fld>
             <a:endParaRPr lang="en-GB"/>
           </a:p>
@@ -1430,7 +1430,7 @@
           <a:p>
             <a:fld id="{4C324CBA-B5F8-49E4-A74D-FDDDFCEF0F4B}" type="datetimeFigureOut">
               <a:rPr lang="en-GB" smtClean="0"/>
-              <a:t>25/08/2021</a:t>
+              <a:t>29/08/2021</a:t>
             </a:fld>
             <a:endParaRPr lang="en-GB"/>
           </a:p>
@@ -1845,7 +1845,7 @@
           <a:p>
             <a:fld id="{4C324CBA-B5F8-49E4-A74D-FDDDFCEF0F4B}" type="datetimeFigureOut">
               <a:rPr lang="en-GB" smtClean="0"/>
-              <a:t>25/08/2021</a:t>
+              <a:t>29/08/2021</a:t>
             </a:fld>
             <a:endParaRPr lang="en-GB"/>
           </a:p>
@@ -1987,7 +1987,7 @@
           <a:p>
             <a:fld id="{4C324CBA-B5F8-49E4-A74D-FDDDFCEF0F4B}" type="datetimeFigureOut">
               <a:rPr lang="en-GB" smtClean="0"/>
-              <a:t>25/08/2021</a:t>
+              <a:t>29/08/2021</a:t>
             </a:fld>
             <a:endParaRPr lang="en-GB"/>
           </a:p>
@@ -2100,7 +2100,7 @@
           <a:p>
             <a:fld id="{4C324CBA-B5F8-49E4-A74D-FDDDFCEF0F4B}" type="datetimeFigureOut">
               <a:rPr lang="en-GB" smtClean="0"/>
-              <a:t>25/08/2021</a:t>
+              <a:t>29/08/2021</a:t>
             </a:fld>
             <a:endParaRPr lang="en-GB"/>
           </a:p>
@@ -2413,7 +2413,7 @@
           <a:p>
             <a:fld id="{4C324CBA-B5F8-49E4-A74D-FDDDFCEF0F4B}" type="datetimeFigureOut">
               <a:rPr lang="en-GB" smtClean="0"/>
-              <a:t>25/08/2021</a:t>
+              <a:t>29/08/2021</a:t>
             </a:fld>
             <a:endParaRPr lang="en-GB"/>
           </a:p>
@@ -2702,7 +2702,7 @@
           <a:p>
             <a:fld id="{4C324CBA-B5F8-49E4-A74D-FDDDFCEF0F4B}" type="datetimeFigureOut">
               <a:rPr lang="en-GB" smtClean="0"/>
-              <a:t>25/08/2021</a:t>
+              <a:t>29/08/2021</a:t>
             </a:fld>
             <a:endParaRPr lang="en-GB"/>
           </a:p>
@@ -2947,7 +2947,7 @@
             <a:fld id="{4C324CBA-B5F8-49E4-A74D-FDDDFCEF0F4B}" type="datetimeFigureOut">
               <a:rPr lang="en-GB" smtClean="0"/>
               <a:pPr/>
-              <a:t>25/08/2021</a:t>
+              <a:t>29/08/2021</a:t>
             </a:fld>
             <a:endParaRPr lang="en-GB" dirty="0"/>
           </a:p>
@@ -5207,6 +5207,54 @@
                 <a:ea typeface="+mj-ea"/>
                 <a:cs typeface="+mj-cs"/>
               </a:rPr>
+              <a:t>Rich   </a:t>
+            </a:r>
+          </a:p>
+          <a:p>
+            <a:r>
+              <a:rPr lang="en-GB" sz="3000" dirty="0">
+                <a:solidFill>
+                  <a:prstClr val="black"/>
+                </a:solidFill>
+                <a:latin typeface="APL385 Unicode" panose="020B0709000202000203" pitchFamily="49" charset="0"/>
+                <a:ea typeface="+mj-ea"/>
+                <a:cs typeface="+mj-cs"/>
+              </a:rPr>
+              <a:t>      </a:t>
+            </a:r>
+            <a:r>
+              <a:rPr lang="en-GB" sz="3000" dirty="0" err="1">
+                <a:solidFill>
+                  <a:prstClr val="black"/>
+                </a:solidFill>
+                <a:latin typeface="APL385 Unicode" panose="020B0709000202000203" pitchFamily="49" charset="0"/>
+                <a:ea typeface="+mj-ea"/>
+                <a:cs typeface="+mj-cs"/>
+              </a:rPr>
+              <a:t>WhoAteMost</a:t>
+            </a:r>
+            <a:r>
+              <a:rPr lang="en-GB" sz="3000" dirty="0">
+                <a:solidFill>
+                  <a:prstClr val="black"/>
+                </a:solidFill>
+                <a:latin typeface="APL385 Unicode" panose="020B0709000202000203" pitchFamily="49" charset="0"/>
+                <a:ea typeface="+mj-ea"/>
+                <a:cs typeface="+mj-cs"/>
+              </a:rPr>
+              <a:t> 3 7⍴'OrangesBananasMangoes'</a:t>
+            </a:r>
+          </a:p>
+          <a:p>
+            <a:r>
+              <a:rPr lang="en-GB" sz="3000" dirty="0">
+                <a:solidFill>
+                  <a:prstClr val="black"/>
+                </a:solidFill>
+                <a:latin typeface="APL385 Unicode" panose="020B0709000202000203" pitchFamily="49" charset="0"/>
+                <a:ea typeface="+mj-ea"/>
+                <a:cs typeface="+mj-cs"/>
+              </a:rPr>
               <a:t>Adam   </a:t>
             </a:r>
           </a:p>
@@ -5242,7 +5290,7 @@
                 <a:ea typeface="+mj-ea"/>
                 <a:cs typeface="+mj-cs"/>
               </a:rPr>
-              <a:t> 2 7⍴'OrangesMangoes'</a:t>
+              <a:t> 1 7⍴'Mangoes'</a:t>
             </a:r>
           </a:p>
           <a:p>
@@ -5255,7 +5303,7 @@
                 <a:ea typeface="+mj-ea"/>
                 <a:cs typeface="+mj-cs"/>
               </a:rPr>
-              <a:t>Rodrigo   </a:t>
+              <a:t>Adam   </a:t>
             </a:r>
           </a:p>
           <a:p>
@@ -5268,61 +5316,8 @@
                 <a:ea typeface="+mj-ea"/>
                 <a:cs typeface="+mj-cs"/>
               </a:rPr>
-              <a:t>      </a:t>
-            </a:r>
-            <a:r>
-              <a:rPr lang="en-GB" sz="3000" dirty="0" err="1">
-                <a:solidFill>
-                  <a:prstClr val="black"/>
-                </a:solidFill>
-                <a:latin typeface="APL385 Unicode" panose="020B0709000202000203" pitchFamily="49" charset="0"/>
-                <a:ea typeface="+mj-ea"/>
-                <a:cs typeface="+mj-cs"/>
-              </a:rPr>
-              <a:t>WhoAteMost</a:t>
-            </a:r>
-            <a:r>
-              <a:rPr lang="en-GB" sz="3000" dirty="0">
-                <a:solidFill>
-                  <a:prstClr val="black"/>
-                </a:solidFill>
-                <a:latin typeface="APL385 Unicode" panose="020B0709000202000203" pitchFamily="49" charset="0"/>
-                <a:ea typeface="+mj-ea"/>
-                <a:cs typeface="+mj-cs"/>
-              </a:rPr>
-              <a:t> 1 7⍴'Oranges'</a:t>
-            </a:r>
-          </a:p>
-          <a:p>
-            <a:r>
-              <a:rPr lang="en-GB" sz="3000" dirty="0">
-                <a:solidFill>
-                  <a:prstClr val="black"/>
-                </a:solidFill>
-                <a:latin typeface="APL385 Unicode" panose="020B0709000202000203" pitchFamily="49" charset="0"/>
-                <a:ea typeface="+mj-ea"/>
-                <a:cs typeface="+mj-cs"/>
-              </a:rPr>
-              <a:t>Adam </a:t>
-            </a:r>
-            <a:endParaRPr lang="en-GB" sz="3000" dirty="0">
-              <a:solidFill>
-                <a:prstClr val="black"/>
-              </a:solidFill>
-              <a:latin typeface="Atkinson Hyperlegible" pitchFamily="50" charset="0"/>
-              <a:ea typeface="+mj-ea"/>
-              <a:cs typeface="+mj-cs"/>
-            </a:endParaRPr>
-          </a:p>
-          <a:p>
-            <a:endParaRPr lang="en-GB" sz="3000" dirty="0">
-              <a:solidFill>
-                <a:prstClr val="black"/>
-              </a:solidFill>
-              <a:latin typeface="Atkinson Hyperlegible" pitchFamily="50" charset="0"/>
-              <a:ea typeface="+mj-ea"/>
-              <a:cs typeface="+mj-cs"/>
-            </a:endParaRPr>
+              <a:t>Rich </a:t>
+            </a:r>
           </a:p>
         </p:txBody>
       </p:sp>
@@ -5371,7 +5366,7 @@
         <p:spPr>
           <a:xfrm>
             <a:off x="696000" y="729000"/>
-            <a:ext cx="10800000" cy="3877985"/>
+            <a:ext cx="10800000" cy="4985980"/>
           </a:xfrm>
           <a:prstGeom prst="rect">
             <a:avLst/>
@@ -5550,18 +5545,18 @@
           </a:p>
           <a:p>
             <a:r>
-              <a:rPr lang="en-US" sz="2200" dirty="0">
-                <a:solidFill>
-                  <a:prstClr val="black"/>
-                </a:solidFill>
-                <a:latin typeface="APL385 Unicode" panose="020B0709000202000203" pitchFamily="49" charset="0"/>
-                <a:ea typeface="+mj-ea"/>
-                <a:cs typeface="+mj-cs"/>
-              </a:rPr>
-              <a:t>       (2 3⍴'WedTue') </a:t>
-            </a:r>
-            <a:r>
-              <a:rPr lang="en-US" sz="2200" dirty="0" err="1">
+              <a:rPr lang="en-US" sz="2000" dirty="0">
+                <a:solidFill>
+                  <a:prstClr val="black"/>
+                </a:solidFill>
+                <a:latin typeface="APL385 Unicode" panose="020B0709000202000203" pitchFamily="49" charset="0"/>
+                <a:ea typeface="+mj-ea"/>
+                <a:cs typeface="+mj-cs"/>
+              </a:rPr>
+              <a:t>      (2 3⍴'WedTue') </a:t>
+            </a:r>
+            <a:r>
+              <a:rPr lang="en-US" sz="2000" dirty="0" err="1">
                 <a:solidFill>
                   <a:prstClr val="black"/>
                 </a:solidFill>
@@ -5572,7 +5567,7 @@
               <a:t>AteMostOnWeekdays</a:t>
             </a:r>
             <a:r>
-              <a:rPr lang="en-US" sz="2200" dirty="0">
+              <a:rPr lang="en-US" sz="2000" dirty="0">
                 <a:solidFill>
                   <a:prstClr val="black"/>
                 </a:solidFill>
@@ -5585,16 +5580,18 @@
           </a:p>
           <a:p>
             <a:r>
-              <a:rPr lang="en-US" sz="2200" dirty="0">
-                <a:solidFill>
-                  <a:prstClr val="black"/>
-                </a:solidFill>
-                <a:latin typeface="APL385 Unicode" panose="020B0709000202000203" pitchFamily="49" charset="0"/>
-                <a:ea typeface="+mj-ea"/>
-                <a:cs typeface="+mj-cs"/>
-              </a:rPr>
-              <a:t>Rich</a:t>
-            </a:r>
+              <a:rPr lang="en-US" sz="2000" dirty="0">
+                <a:solidFill>
+                  <a:prstClr val="black"/>
+                </a:solidFill>
+                <a:latin typeface="APL385 Unicode" panose="020B0709000202000203" pitchFamily="49" charset="0"/>
+                <a:ea typeface="+mj-ea"/>
+                <a:cs typeface="+mj-cs"/>
+              </a:rPr>
+              <a:t>Rodrigo</a:t>
+            </a:r>
+          </a:p>
+          <a:p>
             <a:endParaRPr lang="en-US" sz="2000" dirty="0">
               <a:solidFill>
                 <a:prstClr val="black"/>
@@ -5606,18 +5603,18 @@
           </a:p>
           <a:p>
             <a:r>
-              <a:rPr lang="en-US" sz="2200" dirty="0">
-                <a:solidFill>
-                  <a:prstClr val="black"/>
-                </a:solidFill>
-                <a:latin typeface="APL385 Unicode" panose="020B0709000202000203" pitchFamily="49" charset="0"/>
-                <a:ea typeface="+mj-ea"/>
-                <a:cs typeface="+mj-cs"/>
-              </a:rPr>
-              <a:t>       (3 3⍴'MonWedFri') </a:t>
-            </a:r>
-            <a:r>
-              <a:rPr lang="en-US" sz="2200" dirty="0" err="1">
+              <a:rPr lang="en-US" sz="2000" dirty="0">
+                <a:solidFill>
+                  <a:prstClr val="black"/>
+                </a:solidFill>
+                <a:latin typeface="APL385 Unicode" panose="020B0709000202000203" pitchFamily="49" charset="0"/>
+                <a:ea typeface="+mj-ea"/>
+                <a:cs typeface="+mj-cs"/>
+              </a:rPr>
+              <a:t>      (3 3⍴'MonWedFri') </a:t>
+            </a:r>
+            <a:r>
+              <a:rPr lang="en-US" sz="2000" dirty="0" err="1">
                 <a:solidFill>
                   <a:prstClr val="black"/>
                 </a:solidFill>
@@ -5628,28 +5625,86 @@
               <a:t>AteMostOnWeekdays</a:t>
             </a:r>
             <a:r>
-              <a:rPr lang="en-US" sz="2200" dirty="0">
-                <a:solidFill>
-                  <a:prstClr val="black"/>
-                </a:solidFill>
-                <a:latin typeface="APL385 Unicode" panose="020B0709000202000203" pitchFamily="49" charset="0"/>
-                <a:ea typeface="+mj-ea"/>
-                <a:cs typeface="+mj-cs"/>
-              </a:rPr>
-              <a:t> 2 7⍴'Apples Oranges'</a:t>
-            </a:r>
-          </a:p>
-          <a:p>
-            <a:r>
-              <a:rPr lang="en-US" sz="2200" dirty="0">
-                <a:solidFill>
-                  <a:prstClr val="black"/>
-                </a:solidFill>
-                <a:latin typeface="APL385 Unicode" panose="020B0709000202000203" pitchFamily="49" charset="0"/>
-                <a:ea typeface="+mj-ea"/>
-                <a:cs typeface="+mj-cs"/>
-              </a:rPr>
-              <a:t>Adam</a:t>
+              <a:rPr lang="en-US" sz="2000" dirty="0">
+                <a:solidFill>
+                  <a:prstClr val="black"/>
+                </a:solidFill>
+                <a:latin typeface="APL385 Unicode" panose="020B0709000202000203" pitchFamily="49" charset="0"/>
+                <a:ea typeface="+mj-ea"/>
+                <a:cs typeface="+mj-cs"/>
+              </a:rPr>
+              <a:t> 3 7⍴'OrangesBananasMangoes'</a:t>
+            </a:r>
+          </a:p>
+          <a:p>
+            <a:r>
+              <a:rPr lang="en-US" sz="2000" dirty="0">
+                <a:solidFill>
+                  <a:prstClr val="black"/>
+                </a:solidFill>
+                <a:latin typeface="APL385 Unicode" panose="020B0709000202000203" pitchFamily="49" charset="0"/>
+                <a:ea typeface="+mj-ea"/>
+                <a:cs typeface="+mj-cs"/>
+              </a:rPr>
+              <a:t>Adam   </a:t>
+            </a:r>
+          </a:p>
+          <a:p>
+            <a:endParaRPr lang="en-US" sz="2000" dirty="0">
+              <a:solidFill>
+                <a:prstClr val="black"/>
+              </a:solidFill>
+              <a:latin typeface="APL385 Unicode" panose="020B0709000202000203" pitchFamily="49" charset="0"/>
+              <a:ea typeface="+mj-ea"/>
+              <a:cs typeface="+mj-cs"/>
+            </a:endParaRPr>
+          </a:p>
+          <a:p>
+            <a:r>
+              <a:rPr lang="en-US" sz="2000" dirty="0">
+                <a:solidFill>
+                  <a:prstClr val="black"/>
+                </a:solidFill>
+                <a:latin typeface="APL385 Unicode" panose="020B0709000202000203" pitchFamily="49" charset="0"/>
+                <a:ea typeface="+mj-ea"/>
+                <a:cs typeface="+mj-cs"/>
+              </a:rPr>
+              <a:t>      (3 3⍴'MonThuFri') </a:t>
+            </a:r>
+            <a:r>
+              <a:rPr lang="en-US" sz="2000" dirty="0" err="1">
+                <a:solidFill>
+                  <a:prstClr val="black"/>
+                </a:solidFill>
+                <a:latin typeface="APL385 Unicode" panose="020B0709000202000203" pitchFamily="49" charset="0"/>
+                <a:ea typeface="+mj-ea"/>
+                <a:cs typeface="+mj-cs"/>
+              </a:rPr>
+              <a:t>AteMostOnWeekdays</a:t>
+            </a:r>
+            <a:r>
+              <a:rPr lang="en-US" sz="2000" dirty="0">
+                <a:solidFill>
+                  <a:prstClr val="black"/>
+                </a:solidFill>
+                <a:latin typeface="APL385 Unicode" panose="020B0709000202000203" pitchFamily="49" charset="0"/>
+                <a:ea typeface="+mj-ea"/>
+                <a:cs typeface="+mj-cs"/>
+              </a:rPr>
+              <a:t> 2 7⍴'BananasMangoes'</a:t>
+            </a:r>
+          </a:p>
+          <a:p>
+            <a:r>
+              <a:rPr lang="en-US" sz="2000" dirty="0">
+                <a:solidFill>
+                  <a:prstClr val="black"/>
+                </a:solidFill>
+                <a:latin typeface="APL385 Unicode" panose="020B0709000202000203" pitchFamily="49" charset="0"/>
+                <a:ea typeface="+mj-ea"/>
+                <a:cs typeface="+mj-cs"/>
+              </a:rPr>
+              <a:t>Rich </a:t>
             </a:r>
           </a:p>
         </p:txBody>
@@ -5699,7 +5754,7 @@
         <p:spPr>
           <a:xfrm>
             <a:off x="696000" y="729000"/>
-            <a:ext cx="10800000" cy="3477875"/>
+            <a:ext cx="10800000" cy="5570756"/>
           </a:xfrm>
           <a:prstGeom prst="rect">
             <a:avLst/>
@@ -5868,7 +5923,7 @@
           </a:p>
           <a:p>
             <a:r>
-              <a:rPr lang="en-GB" sz="2000" dirty="0">
+              <a:rPr lang="en-GB" dirty="0">
                 <a:solidFill>
                   <a:prstClr val="black"/>
                 </a:solidFill>
@@ -5879,7 +5934,7 @@
               <a:t>      (2 7⍴'RodrigoRich   ') </a:t>
             </a:r>
             <a:r>
-              <a:rPr lang="en-GB" sz="2000" dirty="0" err="1">
+              <a:rPr lang="en-GB" dirty="0" err="1">
                 <a:solidFill>
                   <a:prstClr val="black"/>
                 </a:solidFill>
@@ -5890,44 +5945,67 @@
               <a:t>DayMostFruitEaten</a:t>
             </a:r>
             <a:r>
-              <a:rPr lang="en-GB" sz="2000" dirty="0">
-                <a:solidFill>
-                  <a:prstClr val="black"/>
-                </a:solidFill>
-                <a:latin typeface="APL385 Unicode" panose="020B0709000202000203" pitchFamily="49" charset="0"/>
-                <a:ea typeface="+mj-ea"/>
-                <a:cs typeface="+mj-cs"/>
-              </a:rPr>
-              <a:t> 2 7⍴'OrangesMangoes'</a:t>
-            </a:r>
-          </a:p>
-          <a:p>
-            <a:r>
-              <a:rPr lang="en-GB" sz="2000" dirty="0">
-                <a:solidFill>
-                  <a:prstClr val="black"/>
-                </a:solidFill>
-                <a:latin typeface="APL385 Unicode" panose="020B0709000202000203" pitchFamily="49" charset="0"/>
-                <a:ea typeface="+mj-ea"/>
-                <a:cs typeface="+mj-cs"/>
-              </a:rPr>
-              <a:t>Wed</a:t>
-            </a:r>
-          </a:p>
-          <a:p>
-            <a:r>
-              <a:rPr lang="en-GB" sz="2000" dirty="0">
-                <a:solidFill>
-                  <a:prstClr val="black"/>
-                </a:solidFill>
-                <a:latin typeface="APL385 Unicode" panose="020B0709000202000203" pitchFamily="49" charset="0"/>
-                <a:ea typeface="+mj-ea"/>
-                <a:cs typeface="+mj-cs"/>
-              </a:rPr>
-              <a:t>      names </a:t>
-            </a:r>
-            <a:r>
-              <a:rPr lang="en-GB" sz="2000" dirty="0" err="1">
+              <a:rPr lang="en-GB" dirty="0">
+                <a:solidFill>
+                  <a:prstClr val="black"/>
+                </a:solidFill>
+                <a:latin typeface="APL385 Unicode" panose="020B0709000202000203" pitchFamily="49" charset="0"/>
+                <a:ea typeface="+mj-ea"/>
+                <a:cs typeface="+mj-cs"/>
+              </a:rPr>
+              <a:t> 3 7⍴'OrangesMangoesBananas'</a:t>
+            </a:r>
+          </a:p>
+          <a:p>
+            <a:r>
+              <a:rPr lang="en-GB" dirty="0">
+                <a:solidFill>
+                  <a:prstClr val="black"/>
+                </a:solidFill>
+                <a:latin typeface="APL385 Unicode" panose="020B0709000202000203" pitchFamily="49" charset="0"/>
+                <a:ea typeface="+mj-ea"/>
+                <a:cs typeface="+mj-cs"/>
+              </a:rPr>
+              <a:t>Tue</a:t>
+            </a:r>
+          </a:p>
+          <a:p>
+            <a:r>
+              <a:rPr lang="en-GB" dirty="0">
+                <a:solidFill>
+                  <a:prstClr val="black"/>
+                </a:solidFill>
+                <a:latin typeface="APL385 Unicode" panose="020B0709000202000203" pitchFamily="49" charset="0"/>
+                <a:ea typeface="+mj-ea"/>
+                <a:cs typeface="+mj-cs"/>
+              </a:rPr>
+              <a:t>Thu</a:t>
+            </a:r>
+          </a:p>
+          <a:p>
+            <a:endParaRPr lang="en-GB" dirty="0">
+              <a:solidFill>
+                <a:prstClr val="black"/>
+              </a:solidFill>
+              <a:latin typeface="APL385 Unicode" panose="020B0709000202000203" pitchFamily="49" charset="0"/>
+              <a:ea typeface="+mj-ea"/>
+              <a:cs typeface="+mj-cs"/>
+            </a:endParaRPr>
+          </a:p>
+          <a:p>
+            <a:r>
+              <a:rPr lang="en-GB" dirty="0">
+                <a:solidFill>
+                  <a:prstClr val="black"/>
+                </a:solidFill>
+                <a:latin typeface="APL385 Unicode" panose="020B0709000202000203" pitchFamily="49" charset="0"/>
+                <a:ea typeface="+mj-ea"/>
+                <a:cs typeface="+mj-cs"/>
+              </a:rPr>
+              <a:t>      (2 7⍴'Adam   Rich   ') </a:t>
+            </a:r>
+            <a:r>
+              <a:rPr lang="en-GB" dirty="0" err="1">
                 <a:solidFill>
                   <a:prstClr val="black"/>
                 </a:solidFill>
@@ -5938,20 +6016,91 @@
               <a:t>DayMostFruitEaten</a:t>
             </a:r>
             <a:r>
-              <a:rPr lang="en-GB" sz="2000" dirty="0">
-                <a:solidFill>
-                  <a:prstClr val="black"/>
-                </a:solidFill>
-                <a:latin typeface="APL385 Unicode" panose="020B0709000202000203" pitchFamily="49" charset="0"/>
-                <a:ea typeface="+mj-ea"/>
-                <a:cs typeface="+mj-cs"/>
-              </a:rPr>
-              <a:t> fruits</a:t>
-            </a:r>
-          </a:p>
-          <a:p>
-            <a:r>
-              <a:rPr lang="en-GB" sz="2000" dirty="0">
+              <a:rPr lang="en-GB" dirty="0">
+                <a:solidFill>
+                  <a:prstClr val="black"/>
+                </a:solidFill>
+                <a:latin typeface="APL385 Unicode" panose="020B0709000202000203" pitchFamily="49" charset="0"/>
+                <a:ea typeface="+mj-ea"/>
+                <a:cs typeface="+mj-cs"/>
+              </a:rPr>
+              <a:t> 3 7⍴'OrangesApples '</a:t>
+            </a:r>
+          </a:p>
+          <a:p>
+            <a:r>
+              <a:rPr lang="en-GB" dirty="0">
+                <a:solidFill>
+                  <a:prstClr val="black"/>
+                </a:solidFill>
+                <a:latin typeface="APL385 Unicode" panose="020B0709000202000203" pitchFamily="49" charset="0"/>
+                <a:ea typeface="+mj-ea"/>
+                <a:cs typeface="+mj-cs"/>
+              </a:rPr>
+              <a:t>Sun</a:t>
+            </a:r>
+          </a:p>
+          <a:p>
+            <a:endParaRPr lang="en-GB" dirty="0">
+              <a:solidFill>
+                <a:prstClr val="black"/>
+              </a:solidFill>
+              <a:latin typeface="APL385 Unicode" panose="020B0709000202000203" pitchFamily="49" charset="0"/>
+              <a:ea typeface="+mj-ea"/>
+              <a:cs typeface="+mj-cs"/>
+            </a:endParaRPr>
+          </a:p>
+          <a:p>
+            <a:r>
+              <a:rPr lang="en-GB" dirty="0">
+                <a:solidFill>
+                  <a:prstClr val="black"/>
+                </a:solidFill>
+                <a:latin typeface="APL385 Unicode" panose="020B0709000202000203" pitchFamily="49" charset="0"/>
+                <a:ea typeface="+mj-ea"/>
+                <a:cs typeface="+mj-cs"/>
+              </a:rPr>
+              <a:t>      (1 7⍴'Adam   ') </a:t>
+            </a:r>
+            <a:r>
+              <a:rPr lang="en-GB" dirty="0" err="1">
+                <a:solidFill>
+                  <a:prstClr val="black"/>
+                </a:solidFill>
+                <a:latin typeface="APL385 Unicode" panose="020B0709000202000203" pitchFamily="49" charset="0"/>
+                <a:ea typeface="+mj-ea"/>
+                <a:cs typeface="+mj-cs"/>
+              </a:rPr>
+              <a:t>DayMostFruitEaten</a:t>
+            </a:r>
+            <a:r>
+              <a:rPr lang="en-GB" dirty="0">
+                <a:solidFill>
+                  <a:prstClr val="black"/>
+                </a:solidFill>
+                <a:latin typeface="APL385 Unicode" panose="020B0709000202000203" pitchFamily="49" charset="0"/>
+                <a:ea typeface="+mj-ea"/>
+                <a:cs typeface="+mj-cs"/>
+              </a:rPr>
+              <a:t> 3 7⍴'Mangoes'</a:t>
+            </a:r>
+          </a:p>
+          <a:p>
+            <a:r>
+              <a:rPr lang="en-GB" dirty="0">
+                <a:solidFill>
+                  <a:prstClr val="black"/>
+                </a:solidFill>
+                <a:latin typeface="APL385 Unicode" panose="020B0709000202000203" pitchFamily="49" charset="0"/>
+                <a:ea typeface="+mj-ea"/>
+                <a:cs typeface="+mj-cs"/>
+              </a:rPr>
+              <a:t>Mon</a:t>
+            </a:r>
+          </a:p>
+          <a:p>
+            <a:r>
+              <a:rPr lang="en-GB" dirty="0">
                 <a:solidFill>
                   <a:prstClr val="black"/>
                 </a:solidFill>
@@ -5960,6 +6109,32 @@
                 <a:cs typeface="+mj-cs"/>
               </a:rPr>
               <a:t>Tue</a:t>
+            </a:r>
+          </a:p>
+          <a:p>
+            <a:r>
+              <a:rPr lang="en-GB" dirty="0">
+                <a:solidFill>
+                  <a:prstClr val="black"/>
+                </a:solidFill>
+                <a:latin typeface="APL385 Unicode" panose="020B0709000202000203" pitchFamily="49" charset="0"/>
+                <a:ea typeface="+mj-ea"/>
+                <a:cs typeface="+mj-cs"/>
+              </a:rPr>
+              <a:t>Thu</a:t>
+            </a:r>
+          </a:p>
+          <a:p>
+            <a:r>
+              <a:rPr lang="en-GB" dirty="0">
+                <a:solidFill>
+                  <a:prstClr val="black"/>
+                </a:solidFill>
+                <a:latin typeface="APL385 Unicode" panose="020B0709000202000203" pitchFamily="49" charset="0"/>
+                <a:ea typeface="+mj-ea"/>
+                <a:cs typeface="+mj-cs"/>
+              </a:rPr>
+              <a:t>Fri</a:t>
             </a:r>
           </a:p>
         </p:txBody>

</xml_diff>